<commit_message>
Added 30-31 slide by Artem
</commit_message>
<xml_diff>
--- a/Git_1 part.pptx
+++ b/Git_1 part.pptx
@@ -167,8 +167,8 @@
 <p1510:revInfo xmlns:a="http://schemas.openxmlformats.org/drawingml/2006/main" xmlns:r="http://schemas.openxmlformats.org/officeDocument/2006/relationships" xmlns:p1510="http://schemas.microsoft.com/office/powerpoint/2015/10/main">
   <p1510:revLst>
     <p1510:client id="{4A3F3CD4-87AB-4CDB-98DA-5A2ADC992FE5}" v="1" dt="2022-10-03T11:17:20.651"/>
+    <p1510:client id="{9B9D4C16-5A73-44FC-B81C-E033F386BE81}" v="3" dt="2022-09-29T11:01:00.115"/>
     <p1510:client id="{7243DB7B-6519-4113-9313-0D5BD1DD6196}" v="1" dt="2022-10-06T06:08:40.457"/>
-    <p1510:client id="{9B9D4C16-5A73-44FC-B81C-E033F386BE81}" v="3" dt="2022-09-29T11:01:00.115"/>
     <p1510:client id="{A1854464-AA8C-4528-8FEA-3C375E66B42A}" v="7" dt="2022-10-06T09:52:16.683"/>
   </p1510:revLst>
 </p1510:revInfo>
@@ -368,7 +368,7 @@
           <a:p>
             <a:fld id="{BA11B3C1-C822-4B57-87C0-490649D8D6D7}" type="slidenum">
               <a:rPr lang="ru-RU" smtClean="0"/>
-              <a:t>‹№›</a:t>
+              <a:t>‹#›</a:t>
             </a:fld>
             <a:endParaRPr lang="ru-RU"/>
           </a:p>
@@ -2120,7 +2120,7 @@
           <a:p>
             <a:fld id="{AD567C44-7823-4E15-95B7-ED61455829B8}" type="datetimeFigureOut">
               <a:rPr lang="ru-RU" smtClean="0"/>
-              <a:t>06.11.2022</a:t>
+              <a:t>07.11.2022</a:t>
             </a:fld>
             <a:endParaRPr lang="ru-RU"/>
           </a:p>
@@ -2279,7 +2279,7 @@
           <a:p>
             <a:fld id="{C83854A3-6714-4526-AEDE-747CDFA70004}" type="slidenum">
               <a:rPr lang="ru-RU" smtClean="0"/>
-              <a:t>‹№›</a:t>
+              <a:t>‹#›</a:t>
             </a:fld>
             <a:endParaRPr lang="ru-RU"/>
           </a:p>
@@ -2614,6 +2614,109 @@
       </p:grpSpPr>
       <p:sp>
         <p:nvSpPr>
+          <p:cNvPr id="2" name="Образ слайда 1"/>
+          <p:cNvSpPr>
+            <a:spLocks noGrp="1" noRot="1" noChangeAspect="1"/>
+          </p:cNvSpPr>
+          <p:nvPr>
+            <p:ph type="sldImg"/>
+          </p:nvPr>
+        </p:nvSpPr>
+        <p:spPr/>
+      </p:sp>
+      <p:sp>
+        <p:nvSpPr>
+          <p:cNvPr id="3" name="Заметки 2"/>
+          <p:cNvSpPr>
+            <a:spLocks noGrp="1"/>
+          </p:cNvSpPr>
+          <p:nvPr>
+            <p:ph type="body" idx="1"/>
+          </p:nvPr>
+        </p:nvSpPr>
+        <p:spPr/>
+        <p:txBody>
+          <a:bodyPr/>
+          <a:lstStyle/>
+          <a:p>
+            <a:endParaRPr lang="ru-UA" dirty="0"/>
+          </a:p>
+        </p:txBody>
+      </p:sp>
+      <p:sp>
+        <p:nvSpPr>
+          <p:cNvPr id="4" name="Верхний колонтитул 3"/>
+          <p:cNvSpPr>
+            <a:spLocks noGrp="1"/>
+          </p:cNvSpPr>
+          <p:nvPr>
+            <p:ph type="hdr" sz="quarter" idx="10"/>
+          </p:nvPr>
+        </p:nvSpPr>
+        <p:spPr/>
+        <p:txBody>
+          <a:bodyPr/>
+          <a:lstStyle/>
+          <a:p>
+            <a:endParaRPr lang="ru-RU"/>
+          </a:p>
+        </p:txBody>
+      </p:sp>
+      <p:sp>
+        <p:nvSpPr>
+          <p:cNvPr id="5" name="Номер слайда 4"/>
+          <p:cNvSpPr>
+            <a:spLocks noGrp="1"/>
+          </p:cNvSpPr>
+          <p:nvPr>
+            <p:ph type="sldNum" sz="quarter" idx="11"/>
+          </p:nvPr>
+        </p:nvSpPr>
+        <p:spPr/>
+        <p:txBody>
+          <a:bodyPr/>
+          <a:lstStyle/>
+          <a:p>
+            <a:fld id="{C83854A3-6714-4526-AEDE-747CDFA70004}" type="slidenum">
+              <a:rPr lang="ru-RU" smtClean="0"/>
+              <a:t>8</a:t>
+            </a:fld>
+            <a:endParaRPr lang="ru-RU"/>
+          </a:p>
+        </p:txBody>
+      </p:sp>
+    </p:spTree>
+    <p:extLst>
+      <p:ext uri="{BB962C8B-B14F-4D97-AF65-F5344CB8AC3E}">
+        <p14:creationId xmlns:p14="http://schemas.microsoft.com/office/powerpoint/2010/main" val="639189857"/>
+      </p:ext>
+    </p:extLst>
+  </p:cSld>
+  <p:clrMapOvr>
+    <a:masterClrMapping/>
+  </p:clrMapOvr>
+</p:notes>
+</file>
+
+<file path=ppt/notesSlides/notesSlide4.xml><?xml version="1.0" encoding="utf-8"?>
+<p:notes xmlns:a="http://schemas.openxmlformats.org/drawingml/2006/main" xmlns:r="http://schemas.openxmlformats.org/officeDocument/2006/relationships" xmlns:p="http://schemas.openxmlformats.org/presentationml/2006/main">
+  <p:cSld>
+    <p:spTree>
+      <p:nvGrpSpPr>
+        <p:cNvPr id="1" name=""/>
+        <p:cNvGrpSpPr/>
+        <p:nvPr/>
+      </p:nvGrpSpPr>
+      <p:grpSpPr>
+        <a:xfrm>
+          <a:off x="0" y="0"/>
+          <a:ext cx="0" cy="0"/>
+          <a:chOff x="0" y="0"/>
+          <a:chExt cx="0" cy="0"/>
+        </a:xfrm>
+      </p:grpSpPr>
+      <p:sp>
+        <p:nvSpPr>
           <p:cNvPr id="2" name="Місце для зображення 1"/>
           <p:cNvSpPr>
             <a:spLocks noGrp="1" noRot="1" noChangeAspect="1"/>
@@ -2829,7 +2932,7 @@
           <a:p>
             <a:fld id="{ACD6F5B1-BE64-41EC-9D39-08B20FE66A00}" type="datetime1">
               <a:rPr lang="en-US" smtClean="0"/>
-              <a:t>11/6/2022</a:t>
+              <a:t>11/7/2022</a:t>
             </a:fld>
             <a:endParaRPr lang="en-US"/>
           </a:p>
@@ -2871,7 +2974,7 @@
           <a:p>
             <a:fld id="{6D22F896-40B5-4ADD-8801-0D06FADFA095}" type="slidenum">
               <a:rPr lang="en-US" smtClean="0"/>
-              <a:t>‹№›</a:t>
+              <a:t>‹#›</a:t>
             </a:fld>
             <a:endParaRPr lang="en-US"/>
           </a:p>
@@ -2999,7 +3102,7 @@
           <a:p>
             <a:fld id="{2A780207-E750-478A-BD8D-014DF4CF007A}" type="datetime1">
               <a:rPr lang="en-US" smtClean="0"/>
-              <a:t>11/6/2022</a:t>
+              <a:t>11/7/2022</a:t>
             </a:fld>
             <a:endParaRPr lang="en-US"/>
           </a:p>
@@ -3041,7 +3144,7 @@
           <a:p>
             <a:fld id="{6D22F896-40B5-4ADD-8801-0D06FADFA095}" type="slidenum">
               <a:rPr lang="en-US" smtClean="0"/>
-              <a:t>‹№›</a:t>
+              <a:t>‹#›</a:t>
             </a:fld>
             <a:endParaRPr lang="en-US"/>
           </a:p>
@@ -3179,7 +3282,7 @@
           <a:p>
             <a:fld id="{A9840149-181F-4DE2-A970-6210963938A6}" type="datetime1">
               <a:rPr lang="en-US" smtClean="0"/>
-              <a:t>11/6/2022</a:t>
+              <a:t>11/7/2022</a:t>
             </a:fld>
             <a:endParaRPr lang="en-US"/>
           </a:p>
@@ -3221,7 +3324,7 @@
           <a:p>
             <a:fld id="{6D22F896-40B5-4ADD-8801-0D06FADFA095}" type="slidenum">
               <a:rPr lang="en-US" smtClean="0"/>
-              <a:t>‹№›</a:t>
+              <a:t>‹#›</a:t>
             </a:fld>
             <a:endParaRPr lang="en-US"/>
           </a:p>
@@ -3349,7 +3452,7 @@
           <a:p>
             <a:fld id="{B89E07A0-B478-479E-9F53-FC3D4943597C}" type="datetime1">
               <a:rPr lang="en-US" smtClean="0"/>
-              <a:t>11/6/2022</a:t>
+              <a:t>11/7/2022</a:t>
             </a:fld>
             <a:endParaRPr lang="en-US"/>
           </a:p>
@@ -3391,7 +3494,7 @@
           <a:p>
             <a:fld id="{6D22F896-40B5-4ADD-8801-0D06FADFA095}" type="slidenum">
               <a:rPr lang="en-US" smtClean="0"/>
-              <a:t>‹№›</a:t>
+              <a:t>‹#›</a:t>
             </a:fld>
             <a:endParaRPr lang="en-US"/>
           </a:p>
@@ -3595,7 +3698,7 @@
           <a:p>
             <a:fld id="{57D29478-B7BC-4D4A-83DD-BBDD69C0611B}" type="datetime1">
               <a:rPr lang="en-US" smtClean="0"/>
-              <a:t>11/6/2022</a:t>
+              <a:t>11/7/2022</a:t>
             </a:fld>
             <a:endParaRPr lang="en-US"/>
           </a:p>
@@ -3637,7 +3740,7 @@
           <a:p>
             <a:fld id="{6D22F896-40B5-4ADD-8801-0D06FADFA095}" type="slidenum">
               <a:rPr lang="en-US" smtClean="0"/>
-              <a:t>‹№›</a:t>
+              <a:t>‹#›</a:t>
             </a:fld>
             <a:endParaRPr lang="en-US"/>
           </a:p>
@@ -3827,7 +3930,7 @@
           <a:p>
             <a:fld id="{AB65EC0E-07C4-4A98-B23B-FE8F72CE4422}" type="datetime1">
               <a:rPr lang="en-US" smtClean="0"/>
-              <a:t>11/6/2022</a:t>
+              <a:t>11/7/2022</a:t>
             </a:fld>
             <a:endParaRPr lang="en-US"/>
           </a:p>
@@ -3869,7 +3972,7 @@
           <a:p>
             <a:fld id="{6D22F896-40B5-4ADD-8801-0D06FADFA095}" type="slidenum">
               <a:rPr lang="en-US" smtClean="0"/>
-              <a:t>‹№›</a:t>
+              <a:t>‹#›</a:t>
             </a:fld>
             <a:endParaRPr lang="en-US"/>
           </a:p>
@@ -4194,7 +4297,7 @@
           <a:p>
             <a:fld id="{E4AC23B7-51DA-476C-A442-884381F06C35}" type="datetime1">
               <a:rPr lang="en-US" smtClean="0"/>
-              <a:t>11/6/2022</a:t>
+              <a:t>11/7/2022</a:t>
             </a:fld>
             <a:endParaRPr lang="en-US"/>
           </a:p>
@@ -4236,7 +4339,7 @@
           <a:p>
             <a:fld id="{6D22F896-40B5-4ADD-8801-0D06FADFA095}" type="slidenum">
               <a:rPr lang="en-US" smtClean="0"/>
-              <a:t>‹№›</a:t>
+              <a:t>‹#›</a:t>
             </a:fld>
             <a:endParaRPr lang="en-US"/>
           </a:p>
@@ -4312,7 +4415,7 @@
           <a:p>
             <a:fld id="{A2E7ABAE-A376-4680-BBAE-02BBD6A0489B}" type="datetime1">
               <a:rPr lang="en-US" smtClean="0"/>
-              <a:t>11/6/2022</a:t>
+              <a:t>11/7/2022</a:t>
             </a:fld>
             <a:endParaRPr lang="en-US"/>
           </a:p>
@@ -4354,7 +4457,7 @@
           <a:p>
             <a:fld id="{6D22F896-40B5-4ADD-8801-0D06FADFA095}" type="slidenum">
               <a:rPr lang="en-US" smtClean="0"/>
-              <a:t>‹№›</a:t>
+              <a:t>‹#›</a:t>
             </a:fld>
             <a:endParaRPr lang="en-US"/>
           </a:p>
@@ -4407,7 +4510,7 @@
           <a:p>
             <a:fld id="{C3BC54A3-5549-4766-8E6F-26C5D14359A0}" type="datetime1">
               <a:rPr lang="en-US" smtClean="0"/>
-              <a:t>11/6/2022</a:t>
+              <a:t>11/7/2022</a:t>
             </a:fld>
             <a:endParaRPr lang="en-US"/>
           </a:p>
@@ -4449,7 +4552,7 @@
           <a:p>
             <a:fld id="{6D22F896-40B5-4ADD-8801-0D06FADFA095}" type="slidenum">
               <a:rPr lang="en-US" smtClean="0"/>
-              <a:t>‹№›</a:t>
+              <a:t>‹#›</a:t>
             </a:fld>
             <a:endParaRPr lang="en-US"/>
           </a:p>
@@ -4684,7 +4787,7 @@
           <a:p>
             <a:fld id="{E10F0183-E1B1-42DF-A1BF-100391FFAC24}" type="datetime1">
               <a:rPr lang="en-US" smtClean="0"/>
-              <a:t>11/6/2022</a:t>
+              <a:t>11/7/2022</a:t>
             </a:fld>
             <a:endParaRPr lang="en-US"/>
           </a:p>
@@ -4726,7 +4829,7 @@
           <a:p>
             <a:fld id="{6D22F896-40B5-4ADD-8801-0D06FADFA095}" type="slidenum">
               <a:rPr lang="en-US" smtClean="0"/>
-              <a:t>‹№›</a:t>
+              <a:t>‹#›</a:t>
             </a:fld>
             <a:endParaRPr lang="en-US"/>
           </a:p>
@@ -4941,7 +5044,7 @@
           <a:p>
             <a:fld id="{7417C2D0-2E3F-4779-808A-894DE456022F}" type="datetime1">
               <a:rPr lang="en-US" smtClean="0"/>
-              <a:t>11/6/2022</a:t>
+              <a:t>11/7/2022</a:t>
             </a:fld>
             <a:endParaRPr lang="en-US"/>
           </a:p>
@@ -4983,7 +5086,7 @@
           <a:p>
             <a:fld id="{6D22F896-40B5-4ADD-8801-0D06FADFA095}" type="slidenum">
               <a:rPr lang="en-US" smtClean="0"/>
-              <a:t>‹№›</a:t>
+              <a:t>‹#›</a:t>
             </a:fld>
             <a:endParaRPr lang="en-US"/>
           </a:p>
@@ -5184,7 +5287,7 @@
           <a:p>
             <a:fld id="{EA08E5D3-2824-4421-AFCD-3F1B287A8530}" type="datetime1">
               <a:rPr lang="en-US" smtClean="0"/>
-              <a:t>11/6/2022</a:t>
+              <a:t>11/7/2022</a:t>
             </a:fld>
             <a:endParaRPr lang="en-US"/>
           </a:p>
@@ -5263,7 +5366,7 @@
             <a:fld id="{6D22F896-40B5-4ADD-8801-0D06FADFA095}" type="slidenum">
               <a:rPr lang="en-US" smtClean="0"/>
               <a:pPr/>
-              <a:t>‹№›</a:t>
+              <a:t>‹#›</a:t>
             </a:fld>
             <a:endParaRPr lang="en-US"/>
           </a:p>
@@ -5609,7 +5712,7 @@
         </p:nvSpPr>
         <p:spPr>
           <a:xfrm>
-            <a:off x="1426496" y="1160145"/>
+            <a:off x="1639561" y="-535490"/>
             <a:ext cx="9590468" cy="4537710"/>
           </a:xfrm>
         </p:spPr>
@@ -5659,160 +5762,6 @@
                 <a:latin typeface="SchoolBookCTT" pitchFamily="2" charset="0"/>
               </a:rPr>
             </a:br>
-            <a:r>
-              <a:rPr lang="en-US" sz="3200" b="1" dirty="0" err="1">
-                <a:solidFill>
-                  <a:srgbClr val="413D3D"/>
-                </a:solidFill>
-                <a:latin typeface="SchoolBookCTT" pitchFamily="2" charset="0"/>
-              </a:rPr>
-              <a:t>DemidCompanyNiga</a:t>
-            </a:r>
-            <a:br>
-              <a:rPr lang="ru-RU" sz="3200" b="1" dirty="0">
-                <a:solidFill>
-                  <a:srgbClr val="413D3D"/>
-                </a:solidFill>
-                <a:latin typeface="SchoolBookCTT" pitchFamily="2" charset="0"/>
-              </a:rPr>
-            </a:br>
-            <a:r>
-              <a:rPr lang="en-GB" sz="3200" b="1" dirty="0" err="1">
-                <a:solidFill>
-                  <a:srgbClr val="413D3D"/>
-                </a:solidFill>
-                <a:latin typeface="SchoolBookCTT" pitchFamily="2" charset="0"/>
-              </a:rPr>
-              <a:t>DemidsNiggersBlack</a:t>
-            </a:r>
-            <a:r>
-              <a:rPr lang="en-GB" sz="3200" b="1" dirty="0">
-                <a:solidFill>
-                  <a:srgbClr val="413D3D"/>
-                </a:solidFill>
-                <a:latin typeface="SchoolBookCTT" pitchFamily="2" charset="0"/>
-              </a:rPr>
-              <a:t> present</a:t>
-            </a:r>
-            <a:br>
-              <a:rPr lang="uk-UA" sz="3100" b="1" dirty="0">
-                <a:latin typeface="SchoolBookCTT" pitchFamily="2" charset="0"/>
-              </a:rPr>
-            </a:br>
-            <a:r>
-              <a:rPr lang="ru-RU" sz="3100" b="1" dirty="0">
-                <a:latin typeface="SchoolBookCTT" pitchFamily="2" charset="0"/>
-              </a:rPr>
-              <a:t>Как так?</a:t>
-            </a:r>
-            <a:br>
-              <a:rPr lang="ru-RU" sz="3100" b="1" dirty="0">
-                <a:latin typeface="SchoolBookCTT" pitchFamily="2" charset="0"/>
-              </a:rPr>
-            </a:br>
-            <a:r>
-              <a:rPr lang="ru-RU" sz="3100" b="1" dirty="0">
-                <a:latin typeface="SchoolBookCTT" pitchFamily="2" charset="0"/>
-              </a:rPr>
-              <a:t>Как менять? </a:t>
-            </a:r>
-            <a:br>
-              <a:rPr lang="ru-RU" sz="3100" b="1" dirty="0">
-                <a:latin typeface="SchoolBookCTT" pitchFamily="2" charset="0"/>
-              </a:rPr>
-            </a:br>
-            <a:r>
-              <a:rPr lang="ru-RU" sz="3100" b="1" dirty="0">
-                <a:latin typeface="SchoolBookCTT" pitchFamily="2" charset="0"/>
-              </a:rPr>
-              <a:t>У нас </a:t>
-            </a:r>
-            <a:r>
-              <a:rPr lang="ru-RU" sz="3100" b="1" dirty="0" err="1">
-                <a:latin typeface="SchoolBookCTT" pitchFamily="2" charset="0"/>
-              </a:rPr>
-              <a:t>чето</a:t>
-            </a:r>
-            <a:r>
-              <a:rPr lang="ru-RU" sz="3100" b="1" dirty="0">
-                <a:latin typeface="SchoolBookCTT" pitchFamily="2" charset="0"/>
-              </a:rPr>
-              <a:t> работает</a:t>
-            </a:r>
-            <a:br>
-              <a:rPr lang="ru-RU" sz="3100" b="1" dirty="0">
-                <a:latin typeface="SchoolBookCTT" pitchFamily="2" charset="0"/>
-              </a:rPr>
-            </a:br>
-            <a:r>
-              <a:rPr lang="ru-RU" sz="3100" b="1" dirty="0">
-                <a:latin typeface="SchoolBookCTT" pitchFamily="2" charset="0"/>
-              </a:rPr>
-              <a:t>Мы </a:t>
-            </a:r>
-            <a:r>
-              <a:rPr lang="ru-RU" sz="3100" b="1" dirty="0" err="1">
-                <a:latin typeface="SchoolBookCTT" pitchFamily="2" charset="0"/>
-              </a:rPr>
-              <a:t>ниче</a:t>
-            </a:r>
-            <a:r>
-              <a:rPr lang="ru-RU" sz="3100" b="1" dirty="0">
-                <a:latin typeface="SchoolBookCTT" pitchFamily="2" charset="0"/>
-              </a:rPr>
-              <a:t> не делаем.</a:t>
-            </a:r>
-            <a:br>
-              <a:rPr lang="ru-RU" sz="3100" b="1" dirty="0">
-                <a:latin typeface="SchoolBookCTT" pitchFamily="2" charset="0"/>
-              </a:rPr>
-            </a:br>
-            <a:r>
-              <a:rPr lang="ru-RU" sz="3100" b="1" dirty="0">
-                <a:latin typeface="SchoolBookCTT" pitchFamily="2" charset="0"/>
-              </a:rPr>
-              <a:t>У меня </a:t>
-            </a:r>
-            <a:r>
-              <a:rPr lang="ru-RU" sz="3100" b="1" dirty="0" err="1">
-                <a:latin typeface="SchoolBookCTT" pitchFamily="2" charset="0"/>
-              </a:rPr>
-              <a:t>презенацтия</a:t>
-            </a:r>
-            <a:r>
-              <a:rPr lang="ru-RU" sz="3100" b="1" dirty="0">
-                <a:latin typeface="SchoolBookCTT" pitchFamily="2" charset="0"/>
-              </a:rPr>
-              <a:t> </a:t>
-            </a:r>
-            <a:r>
-              <a:rPr lang="ru-RU" sz="3100" b="1" dirty="0" err="1">
-                <a:latin typeface="SchoolBookCTT" pitchFamily="2" charset="0"/>
-              </a:rPr>
-              <a:t>меняеться</a:t>
-            </a:r>
-            <a:br>
-              <a:rPr lang="ru-RU" sz="3100" b="1" dirty="0">
-                <a:latin typeface="SchoolBookCTT" pitchFamily="2" charset="0"/>
-              </a:rPr>
-            </a:br>
-            <a:r>
-              <a:rPr lang="ru-RU" sz="3100" b="1" dirty="0">
-                <a:latin typeface="SchoolBookCTT" pitchFamily="2" charset="0"/>
-              </a:rPr>
-              <a:t>Только </a:t>
-            </a:r>
-            <a:r>
-              <a:rPr lang="ru-RU" sz="3100" b="1">
-                <a:latin typeface="SchoolBookCTT" pitchFamily="2" charset="0"/>
-              </a:rPr>
-              <a:t>мои изменения</a:t>
-            </a:r>
-            <a:br>
-              <a:rPr lang="uk-UA" sz="3100" b="1" dirty="0">
-                <a:latin typeface="SchoolBookCTT" pitchFamily="2" charset="0"/>
-              </a:rPr>
-            </a:br>
             <a:br>
               <a:rPr lang="uk-UA" sz="2400" b="1" dirty="0">
                 <a:solidFill>
@@ -5827,36 +5776,6 @@
           </a:p>
         </p:txBody>
       </p:sp>
-      <p:pic>
-        <p:nvPicPr>
-          <p:cNvPr id="3" name="Рисунок 2">
-            <a:extLst>
-              <a:ext uri="{FF2B5EF4-FFF2-40B4-BE49-F238E27FC236}">
-                <a16:creationId xmlns:a16="http://schemas.microsoft.com/office/drawing/2014/main" id="{E92858CA-D019-45D5-89E3-43884BED93D1}"/>
-              </a:ext>
-            </a:extLst>
-          </p:cNvPr>
-          <p:cNvPicPr>
-            <a:picLocks noChangeAspect="1"/>
-          </p:cNvPicPr>
-          <p:nvPr/>
-        </p:nvPicPr>
-        <p:blipFill>
-          <a:blip r:embed="rId2"/>
-          <a:stretch>
-            <a:fillRect/>
-          </a:stretch>
-        </p:blipFill>
-        <p:spPr>
-          <a:xfrm>
-            <a:off x="290474" y="251459"/>
-            <a:ext cx="1010292" cy="1411041"/>
-          </a:xfrm>
-          <a:prstGeom prst="rect">
-            <a:avLst/>
-          </a:prstGeom>
-        </p:spPr>
-      </p:pic>
     </p:spTree>
     <p:extLst>
       <p:ext uri="{BB962C8B-B14F-4D97-AF65-F5344CB8AC3E}">
@@ -9719,56 +9638,47 @@
           <a:lstStyle/>
           <a:p>
             <a:br>
-              <a:rPr lang="uk-UA" b="1">
+              <a:rPr lang="uk-UA" b="1" dirty="0">
                 <a:latin typeface="SchoolBookCTT" pitchFamily="2" charset="0"/>
               </a:rPr>
             </a:br>
             <a:br>
-              <a:rPr lang="uk-UA" sz="3600" b="1">
+              <a:rPr lang="uk-UA" sz="3600" b="1" dirty="0">
                 <a:latin typeface="SchoolBookCTT" pitchFamily="2" charset="0"/>
               </a:rPr>
             </a:br>
             <a:br>
-              <a:rPr lang="uk-UA" b="1">
+              <a:rPr lang="uk-UA" b="1" dirty="0">
                 <a:latin typeface="SchoolBookCTT" pitchFamily="2" charset="0"/>
               </a:rPr>
             </a:br>
-            <a:r>
-              <a:rPr lang="en-US" sz="10700" b="1">
+            <a:br>
+              <a:rPr lang="uk-UA" b="1" dirty="0">
                 <a:solidFill>
                   <a:srgbClr val="0070C0"/>
                 </a:solidFill>
                 <a:latin typeface="SchoolBookCTT" pitchFamily="2" charset="0"/>
               </a:rPr>
-              <a:t>Git</a:t>
-            </a:r>
-            <a:br>
-              <a:rPr lang="uk-UA" b="1">
-                <a:solidFill>
-                  <a:srgbClr val="0070C0"/>
-                </a:solidFill>
-                <a:latin typeface="SchoolBookCTT" pitchFamily="2" charset="0"/>
-              </a:rPr>
             </a:br>
             <a:br>
-              <a:rPr lang="uk-UA" sz="3100" b="1">
+              <a:rPr lang="uk-UA" sz="3100" b="1" dirty="0">
                 <a:latin typeface="SchoolBookCTT" pitchFamily="2" charset="0"/>
               </a:rPr>
             </a:br>
             <a:br>
-              <a:rPr lang="uk-UA" sz="3100" b="1">
+              <a:rPr lang="uk-UA" sz="3100" b="1" dirty="0">
                 <a:latin typeface="SchoolBookCTT" pitchFamily="2" charset="0"/>
               </a:rPr>
             </a:br>
             <a:br>
-              <a:rPr lang="uk-UA" sz="2400" b="1">
+              <a:rPr lang="uk-UA" sz="2400" b="1" dirty="0">
                 <a:solidFill>
                   <a:srgbClr val="FF0000"/>
                 </a:solidFill>
                 <a:latin typeface="SchoolBookCTT" pitchFamily="2" charset="0"/>
               </a:rPr>
             </a:br>
-            <a:endParaRPr lang="uk-UA" sz="2400" b="1">
+            <a:endParaRPr lang="uk-UA" sz="2400" b="1" dirty="0">
               <a:latin typeface="SchoolBookCTT" pitchFamily="2" charset="0"/>
             </a:endParaRPr>
           </a:p>
@@ -15767,7 +15677,7 @@
         </p:nvSpPr>
         <p:spPr>
           <a:xfrm>
-            <a:off x="3134060" y="4187725"/>
+            <a:off x="3524677" y="3705363"/>
             <a:ext cx="5513034" cy="369332"/>
           </a:xfrm>
           <a:prstGeom prst="rect">
@@ -16949,7 +16859,7 @@
           <p:nvPr/>
         </p:nvPicPr>
         <p:blipFill>
-          <a:blip r:embed="rId2"/>
+          <a:blip r:embed="rId3"/>
           <a:stretch>
             <a:fillRect/>
           </a:stretch>
@@ -18180,18 +18090,18 @@
 </file>
 
 <file path=customXml/item1.xml><?xml version="1.0" encoding="utf-8"?>
+<p:properties xmlns:p="http://schemas.microsoft.com/office/2006/metadata/properties" xmlns:xsi="http://www.w3.org/2001/XMLSchema-instance" xmlns:pc="http://schemas.microsoft.com/office/infopath/2007/PartnerControls">
+  <documentManagement/>
+</p:properties>
+</file>
+
+<file path=customXml/item2.xml><?xml version="1.0" encoding="utf-8"?>
 <?mso-contentType ?>
 <FormTemplates xmlns="http://schemas.microsoft.com/sharepoint/v3/contenttype/forms">
   <Display>DocumentLibraryForm</Display>
   <Edit>DocumentLibraryForm</Edit>
   <New>DocumentLibraryForm</New>
 </FormTemplates>
-</file>
-
-<file path=customXml/item2.xml><?xml version="1.0" encoding="utf-8"?>
-<p:properties xmlns:p="http://schemas.microsoft.com/office/2006/metadata/properties" xmlns:xsi="http://www.w3.org/2001/XMLSchema-instance" xmlns:pc="http://schemas.microsoft.com/office/infopath/2007/PartnerControls">
-  <documentManagement/>
-</p:properties>
 </file>
 
 <file path=customXml/item3.xml><?xml version="1.0" encoding="utf-8"?>
@@ -18339,18 +18249,18 @@
 </file>
 
 <file path=customXml/itemProps1.xml><?xml version="1.0" encoding="utf-8"?>
-<ds:datastoreItem xmlns:ds="http://schemas.openxmlformats.org/officeDocument/2006/customXml" ds:itemID="{A345D2DA-A096-4BBF-9135-8FD4BD4C8C20}">
+<ds:datastoreItem xmlns:ds="http://schemas.openxmlformats.org/officeDocument/2006/customXml" ds:itemID="{C35D743B-B188-4C38-B82D-7FD8B3A77642}">
   <ds:schemaRefs>
-    <ds:schemaRef ds:uri="http://schemas.microsoft.com/sharepoint/v3/contenttype/forms"/>
+    <ds:schemaRef ds:uri="http://schemas.microsoft.com/office/2006/metadata/properties"/>
+    <ds:schemaRef ds:uri="http://schemas.microsoft.com/office/infopath/2007/PartnerControls"/>
   </ds:schemaRefs>
 </ds:datastoreItem>
 </file>
 
 <file path=customXml/itemProps2.xml><?xml version="1.0" encoding="utf-8"?>
-<ds:datastoreItem xmlns:ds="http://schemas.openxmlformats.org/officeDocument/2006/customXml" ds:itemID="{C35D743B-B188-4C38-B82D-7FD8B3A77642}">
+<ds:datastoreItem xmlns:ds="http://schemas.openxmlformats.org/officeDocument/2006/customXml" ds:itemID="{A345D2DA-A096-4BBF-9135-8FD4BD4C8C20}">
   <ds:schemaRefs>
-    <ds:schemaRef ds:uri="http://schemas.microsoft.com/office/2006/metadata/properties"/>
-    <ds:schemaRef ds:uri="http://schemas.microsoft.com/office/infopath/2007/PartnerControls"/>
+    <ds:schemaRef ds:uri="http://schemas.microsoft.com/sharepoint/v3/contenttype/forms"/>
   </ds:schemaRefs>
 </ds:datastoreItem>
 </file>

</xml_diff>

<commit_message>
Dleleted end of present
</commit_message>
<xml_diff>
--- a/Git_1 part.pptx
+++ b/Git_1 part.pptx
@@ -5,10 +5,10 @@
     <p:sldMasterId id="2147483851" r:id="rId4"/>
   </p:sldMasterIdLst>
   <p:notesMasterIdLst>
-    <p:notesMasterId r:id="rId35"/>
+    <p:notesMasterId r:id="rId34"/>
   </p:notesMasterIdLst>
   <p:handoutMasterIdLst>
-    <p:handoutMasterId r:id="rId36"/>
+    <p:handoutMasterId r:id="rId35"/>
   </p:handoutMasterIdLst>
   <p:sldIdLst>
     <p:sldId id="334" r:id="rId5"/>
@@ -40,7 +40,6 @@
     <p:sldId id="331" r:id="rId31"/>
     <p:sldId id="333" r:id="rId32"/>
     <p:sldId id="332" r:id="rId33"/>
-    <p:sldId id="335" r:id="rId34"/>
   </p:sldIdLst>
   <p:sldSz cx="12192000" cy="6858000"/>
   <p:notesSz cx="6858000" cy="9144000"/>
@@ -166,8 +165,8 @@
 <p1510:revInfo xmlns:a="http://schemas.openxmlformats.org/drawingml/2006/main" xmlns:r="http://schemas.openxmlformats.org/officeDocument/2006/relationships" xmlns:p1510="http://schemas.microsoft.com/office/powerpoint/2015/10/main">
   <p1510:revLst>
     <p1510:client id="{4A3F3CD4-87AB-4CDB-98DA-5A2ADC992FE5}" v="1" dt="2022-10-03T11:17:20.651"/>
+    <p1510:client id="{7243DB7B-6519-4113-9313-0D5BD1DD6196}" v="1" dt="2022-10-06T06:08:40.457"/>
     <p1510:client id="{9B9D4C16-5A73-44FC-B81C-E033F386BE81}" v="3" dt="2022-09-29T11:01:00.115"/>
-    <p1510:client id="{7243DB7B-6519-4113-9313-0D5BD1DD6196}" v="1" dt="2022-10-06T06:08:40.457"/>
     <p1510:client id="{A1854464-AA8C-4528-8FEA-3C375E66B42A}" v="7" dt="2022-10-06T09:52:16.683"/>
   </p1510:revLst>
 </p1510:revInfo>
@@ -2119,7 +2118,7 @@
           <a:p>
             <a:fld id="{AD567C44-7823-4E15-95B7-ED61455829B8}" type="datetimeFigureOut">
               <a:rPr lang="ru-RU" smtClean="0"/>
-              <a:t>04.11.2022</a:t>
+              <a:t>07.11.2022</a:t>
             </a:fld>
             <a:endParaRPr lang="ru-RU"/>
           </a:p>
@@ -2828,7 +2827,7 @@
           <a:p>
             <a:fld id="{ACD6F5B1-BE64-41EC-9D39-08B20FE66A00}" type="datetime1">
               <a:rPr lang="en-US" smtClean="0"/>
-              <a:t>11/4/2022</a:t>
+              <a:t>11/7/2022</a:t>
             </a:fld>
             <a:endParaRPr lang="en-US"/>
           </a:p>
@@ -2998,7 +2997,7 @@
           <a:p>
             <a:fld id="{2A780207-E750-478A-BD8D-014DF4CF007A}" type="datetime1">
               <a:rPr lang="en-US" smtClean="0"/>
-              <a:t>11/4/2022</a:t>
+              <a:t>11/7/2022</a:t>
             </a:fld>
             <a:endParaRPr lang="en-US"/>
           </a:p>
@@ -3178,7 +3177,7 @@
           <a:p>
             <a:fld id="{A9840149-181F-4DE2-A970-6210963938A6}" type="datetime1">
               <a:rPr lang="en-US" smtClean="0"/>
-              <a:t>11/4/2022</a:t>
+              <a:t>11/7/2022</a:t>
             </a:fld>
             <a:endParaRPr lang="en-US"/>
           </a:p>
@@ -3348,7 +3347,7 @@
           <a:p>
             <a:fld id="{B89E07A0-B478-479E-9F53-FC3D4943597C}" type="datetime1">
               <a:rPr lang="en-US" smtClean="0"/>
-              <a:t>11/4/2022</a:t>
+              <a:t>11/7/2022</a:t>
             </a:fld>
             <a:endParaRPr lang="en-US"/>
           </a:p>
@@ -3594,7 +3593,7 @@
           <a:p>
             <a:fld id="{57D29478-B7BC-4D4A-83DD-BBDD69C0611B}" type="datetime1">
               <a:rPr lang="en-US" smtClean="0"/>
-              <a:t>11/4/2022</a:t>
+              <a:t>11/7/2022</a:t>
             </a:fld>
             <a:endParaRPr lang="en-US"/>
           </a:p>
@@ -3826,7 +3825,7 @@
           <a:p>
             <a:fld id="{AB65EC0E-07C4-4A98-B23B-FE8F72CE4422}" type="datetime1">
               <a:rPr lang="en-US" smtClean="0"/>
-              <a:t>11/4/2022</a:t>
+              <a:t>11/7/2022</a:t>
             </a:fld>
             <a:endParaRPr lang="en-US"/>
           </a:p>
@@ -4193,7 +4192,7 @@
           <a:p>
             <a:fld id="{E4AC23B7-51DA-476C-A442-884381F06C35}" type="datetime1">
               <a:rPr lang="en-US" smtClean="0"/>
-              <a:t>11/4/2022</a:t>
+              <a:t>11/7/2022</a:t>
             </a:fld>
             <a:endParaRPr lang="en-US"/>
           </a:p>
@@ -4311,7 +4310,7 @@
           <a:p>
             <a:fld id="{A2E7ABAE-A376-4680-BBAE-02BBD6A0489B}" type="datetime1">
               <a:rPr lang="en-US" smtClean="0"/>
-              <a:t>11/4/2022</a:t>
+              <a:t>11/7/2022</a:t>
             </a:fld>
             <a:endParaRPr lang="en-US"/>
           </a:p>
@@ -4406,7 +4405,7 @@
           <a:p>
             <a:fld id="{C3BC54A3-5549-4766-8E6F-26C5D14359A0}" type="datetime1">
               <a:rPr lang="en-US" smtClean="0"/>
-              <a:t>11/4/2022</a:t>
+              <a:t>11/7/2022</a:t>
             </a:fld>
             <a:endParaRPr lang="en-US"/>
           </a:p>
@@ -4683,7 +4682,7 @@
           <a:p>
             <a:fld id="{E10F0183-E1B1-42DF-A1BF-100391FFAC24}" type="datetime1">
               <a:rPr lang="en-US" smtClean="0"/>
-              <a:t>11/4/2022</a:t>
+              <a:t>11/7/2022</a:t>
             </a:fld>
             <a:endParaRPr lang="en-US"/>
           </a:p>
@@ -4940,7 +4939,7 @@
           <a:p>
             <a:fld id="{7417C2D0-2E3F-4779-808A-894DE456022F}" type="datetime1">
               <a:rPr lang="en-US" smtClean="0"/>
-              <a:t>11/4/2022</a:t>
+              <a:t>11/7/2022</a:t>
             </a:fld>
             <a:endParaRPr lang="en-US"/>
           </a:p>
@@ -5183,7 +5182,7 @@
           <a:p>
             <a:fld id="{EA08E5D3-2824-4421-AFCD-3F1B287A8530}" type="datetime1">
               <a:rPr lang="en-US" smtClean="0"/>
-              <a:t>11/4/2022</a:t>
+              <a:t>11/7/2022</a:t>
             </a:fld>
             <a:endParaRPr lang="en-US"/>
           </a:p>
@@ -15031,185 +15030,6 @@
     <p:extLst>
       <p:ext uri="{BB962C8B-B14F-4D97-AF65-F5344CB8AC3E}">
         <p14:creationId xmlns:p14="http://schemas.microsoft.com/office/powerpoint/2010/main" val="1593836141"/>
-      </p:ext>
-    </p:extLst>
-  </p:cSld>
-  <p:clrMapOvr>
-    <a:masterClrMapping/>
-  </p:clrMapOvr>
-</p:sld>
-</file>
-
-<file path=ppt/slides/slide30.xml><?xml version="1.0" encoding="utf-8"?>
-<p:sld xmlns:a="http://schemas.openxmlformats.org/drawingml/2006/main" xmlns:r="http://schemas.openxmlformats.org/officeDocument/2006/relationships" xmlns:p="http://schemas.openxmlformats.org/presentationml/2006/main">
-  <p:cSld>
-    <p:spTree>
-      <p:nvGrpSpPr>
-        <p:cNvPr id="1" name=""/>
-        <p:cNvGrpSpPr/>
-        <p:nvPr/>
-      </p:nvGrpSpPr>
-      <p:grpSpPr>
-        <a:xfrm>
-          <a:off x="0" y="0"/>
-          <a:ext cx="0" cy="0"/>
-          <a:chOff x="0" y="0"/>
-          <a:chExt cx="0" cy="0"/>
-        </a:xfrm>
-      </p:grpSpPr>
-      <p:sp>
-        <p:nvSpPr>
-          <p:cNvPr id="2" name="Заголовок 1">
-            <a:extLst>
-              <a:ext uri="{FF2B5EF4-FFF2-40B4-BE49-F238E27FC236}">
-                <a16:creationId xmlns:a16="http://schemas.microsoft.com/office/drawing/2014/main" id="{9A149647-34B8-44C3-9D7D-3C3419C82F5C}"/>
-              </a:ext>
-            </a:extLst>
-          </p:cNvPr>
-          <p:cNvSpPr>
-            <a:spLocks noGrp="1"/>
-          </p:cNvSpPr>
-          <p:nvPr>
-            <p:ph type="title"/>
-          </p:nvPr>
-        </p:nvSpPr>
-        <p:spPr/>
-        <p:txBody>
-          <a:bodyPr/>
-          <a:lstStyle/>
-          <a:p>
-            <a:endParaRPr lang="ru-UA" dirty="0">
-              <a:solidFill>
-                <a:srgbClr val="FF0000"/>
-              </a:solidFill>
-            </a:endParaRPr>
-          </a:p>
-        </p:txBody>
-      </p:sp>
-      <p:sp>
-        <p:nvSpPr>
-          <p:cNvPr id="3" name="Объект 2">
-            <a:extLst>
-              <a:ext uri="{FF2B5EF4-FFF2-40B4-BE49-F238E27FC236}">
-                <a16:creationId xmlns:a16="http://schemas.microsoft.com/office/drawing/2014/main" id="{0D41B0E0-1750-4228-BB38-037B22818EA7}"/>
-              </a:ext>
-            </a:extLst>
-          </p:cNvPr>
-          <p:cNvSpPr>
-            <a:spLocks noGrp="1"/>
-          </p:cNvSpPr>
-          <p:nvPr>
-            <p:ph idx="1"/>
-          </p:nvPr>
-        </p:nvSpPr>
-        <p:spPr/>
-        <p:txBody>
-          <a:bodyPr/>
-          <a:lstStyle/>
-          <a:p>
-            <a:pPr marL="0" indent="0" algn="ctr">
-              <a:buNone/>
-            </a:pPr>
-            <a:endParaRPr lang="uk-UA" dirty="0">
-              <a:solidFill>
-                <a:srgbClr val="FF0000"/>
-              </a:solidFill>
-            </a:endParaRPr>
-          </a:p>
-          <a:p>
-            <a:pPr marL="0" indent="0" algn="ctr">
-              <a:buNone/>
-            </a:pPr>
-            <a:endParaRPr lang="uk-UA" dirty="0">
-              <a:solidFill>
-                <a:srgbClr val="FF0000"/>
-              </a:solidFill>
-            </a:endParaRPr>
-          </a:p>
-          <a:p>
-            <a:pPr marL="0" indent="0" algn="ctr">
-              <a:buNone/>
-            </a:pPr>
-            <a:endParaRPr lang="uk-UA" dirty="0">
-              <a:solidFill>
-                <a:srgbClr val="FF0000"/>
-              </a:solidFill>
-            </a:endParaRPr>
-          </a:p>
-          <a:p>
-            <a:pPr marL="0" indent="0" algn="ctr">
-              <a:buNone/>
-            </a:pPr>
-            <a:r>
-              <a:rPr lang="uk-UA" sz="4000" dirty="0">
-                <a:solidFill>
-                  <a:srgbClr val="FF0000"/>
-                </a:solidFill>
-              </a:rPr>
-              <a:t>Дякуємо за увагу!</a:t>
-            </a:r>
-            <a:endParaRPr lang="ru-UA" sz="4000" dirty="0"/>
-          </a:p>
-        </p:txBody>
-      </p:sp>
-      <p:sp>
-        <p:nvSpPr>
-          <p:cNvPr id="4" name="Нижний колонтитул 3">
-            <a:extLst>
-              <a:ext uri="{FF2B5EF4-FFF2-40B4-BE49-F238E27FC236}">
-                <a16:creationId xmlns:a16="http://schemas.microsoft.com/office/drawing/2014/main" id="{566EB642-0DF5-4EAC-B6AE-FA16F9E91EC9}"/>
-              </a:ext>
-            </a:extLst>
-          </p:cNvPr>
-          <p:cNvSpPr>
-            <a:spLocks noGrp="1"/>
-          </p:cNvSpPr>
-          <p:nvPr>
-            <p:ph type="ftr" sz="quarter" idx="11"/>
-          </p:nvPr>
-        </p:nvSpPr>
-        <p:spPr/>
-        <p:txBody>
-          <a:bodyPr/>
-          <a:lstStyle/>
-          <a:p>
-            <a:endParaRPr lang="en-US"/>
-          </a:p>
-        </p:txBody>
-      </p:sp>
-      <p:sp>
-        <p:nvSpPr>
-          <p:cNvPr id="5" name="Номер слайда 4">
-            <a:extLst>
-              <a:ext uri="{FF2B5EF4-FFF2-40B4-BE49-F238E27FC236}">
-                <a16:creationId xmlns:a16="http://schemas.microsoft.com/office/drawing/2014/main" id="{082F5067-CE6E-49F8-9EF6-07E86C0CBC43}"/>
-              </a:ext>
-            </a:extLst>
-          </p:cNvPr>
-          <p:cNvSpPr>
-            <a:spLocks noGrp="1"/>
-          </p:cNvSpPr>
-          <p:nvPr>
-            <p:ph type="sldNum" sz="quarter" idx="12"/>
-          </p:nvPr>
-        </p:nvSpPr>
-        <p:spPr/>
-        <p:txBody>
-          <a:bodyPr/>
-          <a:lstStyle/>
-          <a:p>
-            <a:fld id="{6D22F896-40B5-4ADD-8801-0D06FADFA095}" type="slidenum">
-              <a:rPr lang="en-US" smtClean="0"/>
-              <a:t>30</a:t>
-            </a:fld>
-            <a:endParaRPr lang="en-US"/>
-          </a:p>
-        </p:txBody>
-      </p:sp>
-    </p:spTree>
-    <p:extLst>
-      <p:ext uri="{BB962C8B-B14F-4D97-AF65-F5344CB8AC3E}">
-        <p14:creationId xmlns:p14="http://schemas.microsoft.com/office/powerpoint/2010/main" val="1347747884"/>
       </p:ext>
     </p:extLst>
   </p:cSld>
@@ -17574,18 +17394,18 @@
 </file>
 
 <file path=customXml/item1.xml><?xml version="1.0" encoding="utf-8"?>
+<p:properties xmlns:p="http://schemas.microsoft.com/office/2006/metadata/properties" xmlns:xsi="http://www.w3.org/2001/XMLSchema-instance" xmlns:pc="http://schemas.microsoft.com/office/infopath/2007/PartnerControls">
+  <documentManagement/>
+</p:properties>
+</file>
+
+<file path=customXml/item2.xml><?xml version="1.0" encoding="utf-8"?>
 <?mso-contentType ?>
 <FormTemplates xmlns="http://schemas.microsoft.com/sharepoint/v3/contenttype/forms">
   <Display>DocumentLibraryForm</Display>
   <Edit>DocumentLibraryForm</Edit>
   <New>DocumentLibraryForm</New>
 </FormTemplates>
-</file>
-
-<file path=customXml/item2.xml><?xml version="1.0" encoding="utf-8"?>
-<p:properties xmlns:p="http://schemas.microsoft.com/office/2006/metadata/properties" xmlns:xsi="http://www.w3.org/2001/XMLSchema-instance" xmlns:pc="http://schemas.microsoft.com/office/infopath/2007/PartnerControls">
-  <documentManagement/>
-</p:properties>
 </file>
 
 <file path=customXml/item3.xml><?xml version="1.0" encoding="utf-8"?>
@@ -17733,18 +17553,18 @@
 </file>
 
 <file path=customXml/itemProps1.xml><?xml version="1.0" encoding="utf-8"?>
-<ds:datastoreItem xmlns:ds="http://schemas.openxmlformats.org/officeDocument/2006/customXml" ds:itemID="{A345D2DA-A096-4BBF-9135-8FD4BD4C8C20}">
+<ds:datastoreItem xmlns:ds="http://schemas.openxmlformats.org/officeDocument/2006/customXml" ds:itemID="{C35D743B-B188-4C38-B82D-7FD8B3A77642}">
   <ds:schemaRefs>
-    <ds:schemaRef ds:uri="http://schemas.microsoft.com/sharepoint/v3/contenttype/forms"/>
+    <ds:schemaRef ds:uri="http://schemas.microsoft.com/office/2006/metadata/properties"/>
+    <ds:schemaRef ds:uri="http://schemas.microsoft.com/office/infopath/2007/PartnerControls"/>
   </ds:schemaRefs>
 </ds:datastoreItem>
 </file>
 
 <file path=customXml/itemProps2.xml><?xml version="1.0" encoding="utf-8"?>
-<ds:datastoreItem xmlns:ds="http://schemas.openxmlformats.org/officeDocument/2006/customXml" ds:itemID="{C35D743B-B188-4C38-B82D-7FD8B3A77642}">
+<ds:datastoreItem xmlns:ds="http://schemas.openxmlformats.org/officeDocument/2006/customXml" ds:itemID="{A345D2DA-A096-4BBF-9135-8FD4BD4C8C20}">
   <ds:schemaRefs>
-    <ds:schemaRef ds:uri="http://schemas.microsoft.com/office/2006/metadata/properties"/>
-    <ds:schemaRef ds:uri="http://schemas.microsoft.com/office/infopath/2007/PartnerControls"/>
+    <ds:schemaRef ds:uri="http://schemas.microsoft.com/sharepoint/v3/contenttype/forms"/>
   </ds:schemaRefs>
 </ds:datastoreItem>
 </file>

</xml_diff>

<commit_message>
color of ending changed
</commit_message>
<xml_diff>
--- a/Git_1 part.pptx
+++ b/Git_1 part.pptx
@@ -147,8 +147,8 @@
 <p1510:revInfo xmlns:a="http://schemas.openxmlformats.org/drawingml/2006/main" xmlns:r="http://schemas.openxmlformats.org/officeDocument/2006/relationships" xmlns:p1510="http://schemas.microsoft.com/office/powerpoint/2015/10/main">
   <p1510:revLst>
     <p1510:client id="{4A3F3CD4-87AB-4CDB-98DA-5A2ADC992FE5}" v="1" dt="2022-10-03T11:17:20.651"/>
+    <p1510:client id="{9B9D4C16-5A73-44FC-B81C-E033F386BE81}" v="3" dt="2022-09-29T11:01:00.115"/>
     <p1510:client id="{7243DB7B-6519-4113-9313-0D5BD1DD6196}" v="1" dt="2022-10-06T06:08:40.457"/>
-    <p1510:client id="{9B9D4C16-5A73-44FC-B81C-E033F386BE81}" v="3" dt="2022-09-29T11:01:00.115"/>
     <p1510:client id="{A1854464-AA8C-4528-8FEA-3C375E66B42A}" v="7" dt="2022-10-06T09:52:16.683"/>
   </p1510:revLst>
 </p1510:revInfo>
@@ -7141,7 +7141,12 @@
             <p:ph idx="1"/>
           </p:nvPr>
         </p:nvSpPr>
-        <p:spPr/>
+        <p:spPr>
+          <a:xfrm>
+            <a:off x="952131" y="970215"/>
+            <a:ext cx="10131425" cy="3649133"/>
+          </a:xfrm>
+        </p:spPr>
         <p:txBody>
           <a:bodyPr>
             <a:normAutofit/>
@@ -7152,10 +7157,18 @@
               <a:buNone/>
             </a:pPr>
             <a:r>
-              <a:rPr lang="uk-UA" sz="5400" dirty="0"/>
+              <a:rPr lang="uk-UA" sz="5400" dirty="0">
+                <a:solidFill>
+                  <a:srgbClr val="00B050"/>
+                </a:solidFill>
+              </a:rPr>
               <a:t>Дякуємо за увагу!</a:t>
             </a:r>
-            <a:endParaRPr lang="ru-UA" sz="5400" dirty="0"/>
+            <a:endParaRPr lang="ru-UA" sz="5400" dirty="0">
+              <a:solidFill>
+                <a:srgbClr val="00B050"/>
+              </a:solidFill>
+            </a:endParaRPr>
           </a:p>
         </p:txBody>
       </p:sp>
@@ -10916,6 +10929,12 @@
 </file>
 
 <file path=customXml/item2.xml><?xml version="1.0" encoding="utf-8"?>
+<p:properties xmlns:p="http://schemas.microsoft.com/office/2006/metadata/properties" xmlns:xsi="http://www.w3.org/2001/XMLSchema-instance" xmlns:pc="http://schemas.microsoft.com/office/infopath/2007/PartnerControls">
+  <documentManagement/>
+</p:properties>
+</file>
+
+<file path=customXml/item3.xml><?xml version="1.0" encoding="utf-8"?>
 <ct:contentTypeSchema xmlns:ct="http://schemas.microsoft.com/office/2006/metadata/contentType" xmlns:ma="http://schemas.microsoft.com/office/2006/metadata/properties/metaAttributes" ct:_="" ma:_="" ma:contentTypeName="Документ" ma:contentTypeID="0x0101002456107565CA6A43A05392B760F0FD8D" ma:contentTypeVersion="4" ma:contentTypeDescription="Створення нового документа." ma:contentTypeScope="" ma:versionID="440ddeae695cebc829050b9b618af465">
   <xsd:schema xmlns:xsd="http://www.w3.org/2001/XMLSchema" xmlns:xs="http://www.w3.org/2001/XMLSchema" xmlns:p="http://schemas.microsoft.com/office/2006/metadata/properties" xmlns:ns2="6b47e03e-19f2-493e-94c5-5bbacad2cd70" targetNamespace="http://schemas.microsoft.com/office/2006/metadata/properties" ma:root="true" ma:fieldsID="8376abdcb6cc6889913e7a065f7b4981" ns2:_="">
     <xsd:import namespace="6b47e03e-19f2-493e-94c5-5bbacad2cd70"/>
@@ -11059,12 +11078,6 @@
 </ct:contentTypeSchema>
 </file>
 
-<file path=customXml/item3.xml><?xml version="1.0" encoding="utf-8"?>
-<p:properties xmlns:p="http://schemas.microsoft.com/office/2006/metadata/properties" xmlns:xsi="http://www.w3.org/2001/XMLSchema-instance" xmlns:pc="http://schemas.microsoft.com/office/infopath/2007/PartnerControls">
-  <documentManagement/>
-</p:properties>
-</file>
-
 <file path=customXml/itemProps1.xml><?xml version="1.0" encoding="utf-8"?>
 <ds:datastoreItem xmlns:ds="http://schemas.openxmlformats.org/officeDocument/2006/customXml" ds:itemID="{A345D2DA-A096-4BBF-9135-8FD4BD4C8C20}">
   <ds:schemaRefs>
@@ -11074,6 +11087,15 @@
 </file>
 
 <file path=customXml/itemProps2.xml><?xml version="1.0" encoding="utf-8"?>
+<ds:datastoreItem xmlns:ds="http://schemas.openxmlformats.org/officeDocument/2006/customXml" ds:itemID="{C35D743B-B188-4C38-B82D-7FD8B3A77642}">
+  <ds:schemaRefs>
+    <ds:schemaRef ds:uri="http://schemas.microsoft.com/office/2006/metadata/properties"/>
+    <ds:schemaRef ds:uri="http://schemas.microsoft.com/office/infopath/2007/PartnerControls"/>
+  </ds:schemaRefs>
+</ds:datastoreItem>
+</file>
+
+<file path=customXml/itemProps3.xml><?xml version="1.0" encoding="utf-8"?>
 <ds:datastoreItem xmlns:ds="http://schemas.openxmlformats.org/officeDocument/2006/customXml" ds:itemID="{909E67F0-53DF-4575-B501-3419DF25270A}">
   <ds:schemaRefs>
     <ds:schemaRef ds:uri="6b47e03e-19f2-493e-94c5-5bbacad2cd70"/>
@@ -11089,13 +11111,4 @@
     <ds:schemaRef ds:uri="http://www.w3.org/2001/XMLSchema"/>
   </ds:schemaRefs>
 </ds:datastoreItem>
-</file>
-
-<file path=customXml/itemProps3.xml><?xml version="1.0" encoding="utf-8"?>
-<ds:datastoreItem xmlns:ds="http://schemas.openxmlformats.org/officeDocument/2006/customXml" ds:itemID="{C35D743B-B188-4C38-B82D-7FD8B3A77642}">
-  <ds:schemaRefs>
-    <ds:schemaRef ds:uri="http://schemas.microsoft.com/office/2006/metadata/properties"/>
-    <ds:schemaRef ds:uri="http://schemas.microsoft.com/office/infopath/2007/PartnerControls"/>
-  </ds:schemaRefs>
-</ds:datastoreItem>
 </file>
</xml_diff>

<commit_message>
Add team members list
</commit_message>
<xml_diff>
--- a/Git_1 part.pptx
+++ b/Git_1 part.pptx
@@ -149,8 +149,8 @@
 <p1510:revInfo xmlns:a="http://schemas.openxmlformats.org/drawingml/2006/main" xmlns:r="http://schemas.openxmlformats.org/officeDocument/2006/relationships" xmlns:p1510="http://schemas.microsoft.com/office/powerpoint/2015/10/main">
   <p1510:revLst>
     <p1510:client id="{4A3F3CD4-87AB-4CDB-98DA-5A2ADC992FE5}" v="1" dt="2022-10-03T11:17:20.651"/>
+    <p1510:client id="{7243DB7B-6519-4113-9313-0D5BD1DD6196}" v="1" dt="2022-10-06T06:08:40.457"/>
     <p1510:client id="{9B9D4C16-5A73-44FC-B81C-E033F386BE81}" v="3" dt="2022-09-29T11:01:00.115"/>
-    <p1510:client id="{7243DB7B-6519-4113-9313-0D5BD1DD6196}" v="1" dt="2022-10-06T06:08:40.457"/>
     <p1510:client id="{A1854464-AA8C-4528-8FEA-3C375E66B42A}" v="7" dt="2022-10-06T09:52:16.683"/>
   </p1510:revLst>
 </p1510:revInfo>
@@ -8101,7 +8101,7 @@
                   </a:outerShdw>
                 </a:effectLst>
               </a:rPr>
-              <a:t>Клименко Артем Максимович</a:t>
+              <a:t>Бабенко Станіслав Олексійович</a:t>
             </a:r>
             <a:r>
               <a:rPr lang="en-US" sz="2400" b="1" dirty="0">
@@ -8118,10 +8118,10 @@
                   </a:outerShdw>
                 </a:effectLst>
               </a:rPr>
-              <a:t>(PM)</a:t>
+              <a:t>(Editor)</a:t>
             </a:r>
             <a:br>
-              <a:rPr lang="en-US" sz="2400" b="1" dirty="0">
+              <a:rPr lang="uk-UA" sz="2400" b="1" dirty="0">
                 <a:solidFill>
                   <a:schemeClr val="tx1">
                     <a:lumMod val="95000"/>
@@ -8151,7 +8151,7 @@
                   </a:outerShdw>
                 </a:effectLst>
               </a:rPr>
-              <a:t>Полібін-Щербак Демид Артемович(</a:t>
+              <a:t>Сердюк Костя Олегович</a:t>
             </a:r>
             <a:r>
               <a:rPr lang="en-US" sz="2400" b="1" dirty="0">
@@ -8168,10 +8168,10 @@
                   </a:outerShdw>
                 </a:effectLst>
               </a:rPr>
-              <a:t>PM)</a:t>
+              <a:t>(Editor)</a:t>
             </a:r>
             <a:br>
-              <a:rPr lang="en-US" sz="2400" b="1" dirty="0">
+              <a:rPr lang="uk-UA" sz="2400" b="1" dirty="0">
                 <a:solidFill>
                   <a:schemeClr val="tx1">
                     <a:lumMod val="95000"/>
@@ -8201,7 +8201,7 @@
                   </a:outerShdw>
                 </a:effectLst>
               </a:rPr>
-              <a:t>Фоменко Валентин Олександрович</a:t>
+              <a:t>Шейко Ростислав Олександрович</a:t>
             </a:r>
             <a:r>
               <a:rPr lang="en-US" sz="2400" b="1" dirty="0">
@@ -8218,9 +8218,9 @@
                   </a:outerShdw>
                 </a:effectLst>
               </a:rPr>
-              <a:t>(Editor</a:t>
-            </a:r>
-            <a:r>
+              <a:t>(Editor)</a:t>
+            </a:r>
+            <a:br>
               <a:rPr lang="uk-UA" sz="2400" b="1" dirty="0">
                 <a:solidFill>
                   <a:schemeClr val="tx1">
@@ -8235,62 +8235,7 @@
                   </a:outerShdw>
                 </a:effectLst>
               </a:rPr>
-              <a:t>)</a:t>
-            </a:r>
-          </a:p>
-          <a:p>
-            <a:pPr algn="ctr"/>
-            <a:r>
-              <a:rPr lang="ru-RU" sz="2400" b="1" dirty="0">
-                <a:solidFill>
-                  <a:schemeClr val="tx1">
-                    <a:lumMod val="95000"/>
-                  </a:schemeClr>
-                </a:solidFill>
-                <a:effectLst>
-                  <a:outerShdw blurRad="38100" dist="38100" dir="2700000" algn="tl">
-                    <a:srgbClr val="000000">
-                      <a:alpha val="43137"/>
-                    </a:srgbClr>
-                  </a:outerShdw>
-                </a:effectLst>
-              </a:rPr>
-              <a:t>Зайченко Денис </a:t>
-            </a:r>
-            <a:r>
-              <a:rPr lang="ru-RU" sz="2400" b="1" noProof="1">
-                <a:solidFill>
-                  <a:schemeClr val="tx1">
-                    <a:lumMod val="95000"/>
-                  </a:schemeClr>
-                </a:solidFill>
-                <a:effectLst>
-                  <a:outerShdw blurRad="38100" dist="38100" dir="2700000" algn="tl">
-                    <a:srgbClr val="000000">
-                      <a:alpha val="43137"/>
-                    </a:srgbClr>
-                  </a:outerShdw>
-                </a:effectLst>
-              </a:rPr>
-              <a:t>Сергійович</a:t>
-            </a:r>
-            <a:r>
-              <a:rPr lang="en-US" sz="2400" b="1" dirty="0">
-                <a:solidFill>
-                  <a:schemeClr val="tx1">
-                    <a:lumMod val="95000"/>
-                  </a:schemeClr>
-                </a:solidFill>
-                <a:effectLst>
-                  <a:outerShdw blurRad="38100" dist="38100" dir="2700000" algn="tl">
-                    <a:srgbClr val="000000">
-                      <a:alpha val="43137"/>
-                    </a:srgbClr>
-                  </a:outerShdw>
-                </a:effectLst>
-              </a:rPr>
-              <a:t> (Editor)</a:t>
-            </a:r>
+            </a:br>
             <a:endParaRPr lang="ru-UA" sz="2400" b="1" dirty="0">
               <a:solidFill>
                 <a:schemeClr val="tx1">
@@ -11268,18 +11213,18 @@
 </file>
 
 <file path=customXml/item1.xml><?xml version="1.0" encoding="utf-8"?>
+<p:properties xmlns:p="http://schemas.microsoft.com/office/2006/metadata/properties" xmlns:xsi="http://www.w3.org/2001/XMLSchema-instance" xmlns:pc="http://schemas.microsoft.com/office/infopath/2007/PartnerControls">
+  <documentManagement/>
+</p:properties>
+</file>
+
+<file path=customXml/item2.xml><?xml version="1.0" encoding="utf-8"?>
 <?mso-contentType ?>
 <FormTemplates xmlns="http://schemas.microsoft.com/sharepoint/v3/contenttype/forms">
   <Display>DocumentLibraryForm</Display>
   <Edit>DocumentLibraryForm</Edit>
   <New>DocumentLibraryForm</New>
 </FormTemplates>
-</file>
-
-<file path=customXml/item2.xml><?xml version="1.0" encoding="utf-8"?>
-<p:properties xmlns:p="http://schemas.microsoft.com/office/2006/metadata/properties" xmlns:xsi="http://www.w3.org/2001/XMLSchema-instance" xmlns:pc="http://schemas.microsoft.com/office/infopath/2007/PartnerControls">
-  <documentManagement/>
-</p:properties>
 </file>
 
 <file path=customXml/item3.xml><?xml version="1.0" encoding="utf-8"?>
@@ -11427,18 +11372,18 @@
 </file>
 
 <file path=customXml/itemProps1.xml><?xml version="1.0" encoding="utf-8"?>
-<ds:datastoreItem xmlns:ds="http://schemas.openxmlformats.org/officeDocument/2006/customXml" ds:itemID="{A345D2DA-A096-4BBF-9135-8FD4BD4C8C20}">
+<ds:datastoreItem xmlns:ds="http://schemas.openxmlformats.org/officeDocument/2006/customXml" ds:itemID="{C35D743B-B188-4C38-B82D-7FD8B3A77642}">
   <ds:schemaRefs>
-    <ds:schemaRef ds:uri="http://schemas.microsoft.com/sharepoint/v3/contenttype/forms"/>
+    <ds:schemaRef ds:uri="http://schemas.microsoft.com/office/2006/metadata/properties"/>
+    <ds:schemaRef ds:uri="http://schemas.microsoft.com/office/infopath/2007/PartnerControls"/>
   </ds:schemaRefs>
 </ds:datastoreItem>
 </file>
 
 <file path=customXml/itemProps2.xml><?xml version="1.0" encoding="utf-8"?>
-<ds:datastoreItem xmlns:ds="http://schemas.openxmlformats.org/officeDocument/2006/customXml" ds:itemID="{C35D743B-B188-4C38-B82D-7FD8B3A77642}">
+<ds:datastoreItem xmlns:ds="http://schemas.openxmlformats.org/officeDocument/2006/customXml" ds:itemID="{A345D2DA-A096-4BBF-9135-8FD4BD4C8C20}">
   <ds:schemaRefs>
-    <ds:schemaRef ds:uri="http://schemas.microsoft.com/office/2006/metadata/properties"/>
-    <ds:schemaRef ds:uri="http://schemas.microsoft.com/office/infopath/2007/PartnerControls"/>
+    <ds:schemaRef ds:uri="http://schemas.microsoft.com/sharepoint/v3/contenttype/forms"/>
   </ds:schemaRefs>
 </ds:datastoreItem>
 </file>

</xml_diff>

<commit_message>
Added work of Kostya
</commit_message>
<xml_diff>
--- a/Git_1 part.pptx
+++ b/Git_1 part.pptx
@@ -21,8 +21,8 @@
     <p:sldId id="346" r:id="rId12"/>
     <p:sldId id="347" r:id="rId13"/>
     <p:sldId id="348" r:id="rId14"/>
-    <p:sldId id="335" r:id="rId15"/>
-    <p:sldId id="336" r:id="rId16"/>
+    <p:sldId id="350" r:id="rId15"/>
+    <p:sldId id="349" r:id="rId16"/>
     <p:sldId id="339" r:id="rId17"/>
   </p:sldIdLst>
   <p:sldSz cx="12192000" cy="6858000"/>
@@ -149,8 +149,8 @@
 <p1510:revInfo xmlns:a="http://schemas.openxmlformats.org/drawingml/2006/main" xmlns:r="http://schemas.openxmlformats.org/officeDocument/2006/relationships" xmlns:p1510="http://schemas.microsoft.com/office/powerpoint/2015/10/main">
   <p1510:revLst>
     <p1510:client id="{4A3F3CD4-87AB-4CDB-98DA-5A2ADC992FE5}" v="1" dt="2022-10-03T11:17:20.651"/>
+    <p1510:client id="{9B9D4C16-5A73-44FC-B81C-E033F386BE81}" v="3" dt="2022-09-29T11:01:00.115"/>
     <p1510:client id="{7243DB7B-6519-4113-9313-0D5BD1DD6196}" v="1" dt="2022-10-06T06:08:40.457"/>
-    <p1510:client id="{9B9D4C16-5A73-44FC-B81C-E033F386BE81}" v="3" dt="2022-09-29T11:01:00.115"/>
     <p1510:client id="{A1854464-AA8C-4528-8FEA-3C375E66B42A}" v="7" dt="2022-10-06T09:52:16.683"/>
   </p1510:revLst>
 </p1510:revInfo>
@@ -6906,7 +6906,7 @@
           <p:cNvPr id="2" name="Заголовок 1">
             <a:extLst>
               <a:ext uri="{FF2B5EF4-FFF2-40B4-BE49-F238E27FC236}">
-                <a16:creationId xmlns:a16="http://schemas.microsoft.com/office/drawing/2014/main" id="{D2A85CEB-B942-0761-C894-6ADFDA7A8D20}"/>
+                <a16:creationId xmlns:a16="http://schemas.microsoft.com/office/drawing/2014/main" id="{B9D485B4-14B5-4EFE-AEB9-77B2BB47BFFE}"/>
               </a:ext>
             </a:extLst>
           </p:cNvPr>
@@ -6917,552 +6917,103 @@
             <p:ph type="title"/>
           </p:nvPr>
         </p:nvSpPr>
-        <p:spPr>
-          <a:xfrm>
-            <a:off x="3197987" y="657386"/>
-            <a:ext cx="5796026" cy="1456267"/>
-          </a:xfrm>
-        </p:spPr>
+        <p:spPr/>
         <p:txBody>
           <a:bodyPr/>
           <a:lstStyle/>
           <a:p>
-            <a:pPr algn="ctr"/>
-            <a:r>
-              <a:rPr lang="uk-UA" b="1" i="0" u="none" strike="noStrike" dirty="0">
-                <a:solidFill>
-                  <a:schemeClr val="tx1">
-                    <a:lumMod val="95000"/>
-                  </a:schemeClr>
-                </a:solidFill>
-                <a:effectLst/>
-                <a:latin typeface="SchoolBookCTT"/>
-              </a:rPr>
-              <a:t>Піднесення до степені</a:t>
-            </a:r>
-            <a:r>
-              <a:rPr lang="uk-UA" b="0" i="0" dirty="0">
-                <a:solidFill>
-                  <a:schemeClr val="tx1">
-                    <a:lumMod val="95000"/>
-                  </a:schemeClr>
-                </a:solidFill>
-                <a:effectLst/>
-                <a:latin typeface="SchoolBookCTT"/>
-              </a:rPr>
-              <a:t>​</a:t>
-            </a:r>
-            <a:endParaRPr lang="uk-UA" dirty="0">
-              <a:solidFill>
-                <a:schemeClr val="tx1">
-                  <a:lumMod val="95000"/>
-                </a:schemeClr>
-              </a:solidFill>
-            </a:endParaRPr>
+            <a:endParaRPr lang="ru-UA"/>
           </a:p>
         </p:txBody>
       </p:sp>
       <p:pic>
         <p:nvPicPr>
-          <p:cNvPr id="1026" name="Picture 2">
+          <p:cNvPr id="7" name="Объект 6">
             <a:extLst>
               <a:ext uri="{FF2B5EF4-FFF2-40B4-BE49-F238E27FC236}">
-                <a16:creationId xmlns:a16="http://schemas.microsoft.com/office/drawing/2014/main" id="{1099D3B4-7A06-8A98-4A91-72E82A391A2C}"/>
+                <a16:creationId xmlns:a16="http://schemas.microsoft.com/office/drawing/2014/main" id="{727CA98F-73C3-49D8-9896-4353161D4487}"/>
               </a:ext>
             </a:extLst>
           </p:cNvPr>
           <p:cNvPicPr>
-            <a:picLocks noChangeAspect="1" noChangeArrowheads="1"/>
+            <a:picLocks noGrp="1" noChangeAspect="1"/>
           </p:cNvPicPr>
-          <p:nvPr/>
+          <p:nvPr>
+            <p:ph idx="1"/>
+          </p:nvPr>
         </p:nvPicPr>
         <p:blipFill>
-          <a:blip r:embed="rId2">
-            <a:extLst>
-              <a:ext uri="{28A0092B-C50C-407E-A947-70E740481C1C}">
-                <a14:useLocalDpi xmlns:a14="http://schemas.microsoft.com/office/drawing/2010/main" val="0"/>
-              </a:ext>
-            </a:extLst>
-          </a:blip>
-          <a:srcRect/>
+          <a:blip r:embed="rId2"/>
           <a:stretch>
             <a:fillRect/>
           </a:stretch>
         </p:blipFill>
-        <p:spPr bwMode="auto">
-          <a:xfrm>
-            <a:off x="1283941" y="1842029"/>
-            <a:ext cx="4267200" cy="504825"/>
-          </a:xfrm>
-          <a:prstGeom prst="rect">
-            <a:avLst/>
-          </a:prstGeom>
-          <a:ln>
-            <a:noFill/>
-          </a:ln>
-          <a:effectLst>
-            <a:outerShdw blurRad="292100" dist="139700" dir="2700000" algn="tl" rotWithShape="0">
-              <a:srgbClr val="333333">
-                <a:alpha val="65000"/>
-              </a:srgbClr>
-            </a:outerShdw>
-          </a:effectLst>
-          <a:extLst>
-            <a:ext uri="{909E8E84-426E-40DD-AFC4-6F175D3DCCD1}">
-              <a14:hiddenFill xmlns:a14="http://schemas.microsoft.com/office/drawing/2010/main">
-                <a:solidFill>
-                  <a:srgbClr val="FFFFFF"/>
-                </a:solidFill>
-              </a14:hiddenFill>
-            </a:ext>
-          </a:extLst>
+        <p:spPr>
+          <a:xfrm>
+            <a:off x="-1" y="0"/>
+            <a:ext cx="12192001" cy="6858000"/>
+          </a:xfrm>
         </p:spPr>
       </p:pic>
       <p:sp>
         <p:nvSpPr>
-          <p:cNvPr id="7" name="TextBox 1">
+          <p:cNvPr id="4" name="Нижний колонтитул 3">
             <a:extLst>
               <a:ext uri="{FF2B5EF4-FFF2-40B4-BE49-F238E27FC236}">
-                <a16:creationId xmlns:a16="http://schemas.microsoft.com/office/drawing/2014/main" id="{C113669B-E707-B2AA-2C2B-1F6D6D262F54}"/>
+                <a16:creationId xmlns:a16="http://schemas.microsoft.com/office/drawing/2014/main" id="{9BFC4B18-CB7B-429C-A898-1968E72BD742}"/>
               </a:ext>
             </a:extLst>
           </p:cNvPr>
-          <p:cNvSpPr txBox="1"/>
-          <p:nvPr/>
-        </p:nvSpPr>
-        <p:spPr>
-          <a:xfrm>
-            <a:off x="6369670" y="1790486"/>
-            <a:ext cx="806631" cy="646331"/>
-          </a:xfrm>
-          <a:prstGeom prst="rect">
-            <a:avLst/>
-          </a:prstGeom>
-          <a:noFill/>
-        </p:spPr>
-        <p:txBody>
-          <a:bodyPr wrap="none" rtlCol="0">
-            <a:spAutoFit/>
-          </a:bodyPr>
-          <a:lstStyle>
-            <a:defPPr>
-              <a:defRPr lang="en-US"/>
-            </a:defPPr>
-            <a:lvl1pPr marL="0" algn="l" defTabSz="457200" rtl="0" eaLnBrk="1" latinLnBrk="0" hangingPunct="1">
-              <a:defRPr sz="1800" kern="1200">
-                <a:solidFill>
-                  <a:schemeClr val="tx1"/>
-                </a:solidFill>
-                <a:latin typeface="+mn-lt"/>
-                <a:ea typeface="+mn-ea"/>
-                <a:cs typeface="+mn-cs"/>
-              </a:defRPr>
-            </a:lvl1pPr>
-            <a:lvl2pPr marL="457200" algn="l" defTabSz="457200" rtl="0" eaLnBrk="1" latinLnBrk="0" hangingPunct="1">
-              <a:defRPr sz="1800" kern="1200">
-                <a:solidFill>
-                  <a:schemeClr val="tx1"/>
-                </a:solidFill>
-                <a:latin typeface="+mn-lt"/>
-                <a:ea typeface="+mn-ea"/>
-                <a:cs typeface="+mn-cs"/>
-              </a:defRPr>
-            </a:lvl2pPr>
-            <a:lvl3pPr marL="914400" algn="l" defTabSz="457200" rtl="0" eaLnBrk="1" latinLnBrk="0" hangingPunct="1">
-              <a:defRPr sz="1800" kern="1200">
-                <a:solidFill>
-                  <a:schemeClr val="tx1"/>
-                </a:solidFill>
-                <a:latin typeface="+mn-lt"/>
-                <a:ea typeface="+mn-ea"/>
-                <a:cs typeface="+mn-cs"/>
-              </a:defRPr>
-            </a:lvl3pPr>
-            <a:lvl4pPr marL="1371600" algn="l" defTabSz="457200" rtl="0" eaLnBrk="1" latinLnBrk="0" hangingPunct="1">
-              <a:defRPr sz="1800" kern="1200">
-                <a:solidFill>
-                  <a:schemeClr val="tx1"/>
-                </a:solidFill>
-                <a:latin typeface="+mn-lt"/>
-                <a:ea typeface="+mn-ea"/>
-                <a:cs typeface="+mn-cs"/>
-              </a:defRPr>
-            </a:lvl4pPr>
-            <a:lvl5pPr marL="1828800" algn="l" defTabSz="457200" rtl="0" eaLnBrk="1" latinLnBrk="0" hangingPunct="1">
-              <a:defRPr sz="1800" kern="1200">
-                <a:solidFill>
-                  <a:schemeClr val="tx1"/>
-                </a:solidFill>
-                <a:latin typeface="+mn-lt"/>
-                <a:ea typeface="+mn-ea"/>
-                <a:cs typeface="+mn-cs"/>
-              </a:defRPr>
-            </a:lvl5pPr>
-            <a:lvl6pPr marL="2286000" algn="l" defTabSz="457200" rtl="0" eaLnBrk="1" latinLnBrk="0" hangingPunct="1">
-              <a:defRPr sz="1800" kern="1200">
-                <a:solidFill>
-                  <a:schemeClr val="tx1"/>
-                </a:solidFill>
-                <a:latin typeface="+mn-lt"/>
-                <a:ea typeface="+mn-ea"/>
-                <a:cs typeface="+mn-cs"/>
-              </a:defRPr>
-            </a:lvl6pPr>
-            <a:lvl7pPr marL="2743200" algn="l" defTabSz="457200" rtl="0" eaLnBrk="1" latinLnBrk="0" hangingPunct="1">
-              <a:defRPr sz="1800" kern="1200">
-                <a:solidFill>
-                  <a:schemeClr val="tx1"/>
-                </a:solidFill>
-                <a:latin typeface="+mn-lt"/>
-                <a:ea typeface="+mn-ea"/>
-                <a:cs typeface="+mn-cs"/>
-              </a:defRPr>
-            </a:lvl7pPr>
-            <a:lvl8pPr marL="3200400" algn="l" defTabSz="457200" rtl="0" eaLnBrk="1" latinLnBrk="0" hangingPunct="1">
-              <a:defRPr sz="1800" kern="1200">
-                <a:solidFill>
-                  <a:schemeClr val="tx1"/>
-                </a:solidFill>
-                <a:latin typeface="+mn-lt"/>
-                <a:ea typeface="+mn-ea"/>
-                <a:cs typeface="+mn-cs"/>
-              </a:defRPr>
-            </a:lvl8pPr>
-            <a:lvl9pPr marL="3657600" algn="l" defTabSz="457200" rtl="0" eaLnBrk="1" latinLnBrk="0" hangingPunct="1">
-              <a:defRPr sz="1800" kern="1200">
-                <a:solidFill>
-                  <a:schemeClr val="tx1"/>
-                </a:solidFill>
-                <a:latin typeface="+mn-lt"/>
-                <a:ea typeface="+mn-ea"/>
-                <a:cs typeface="+mn-cs"/>
-              </a:defRPr>
-            </a:lvl9pPr>
-          </a:lstStyle>
-          <a:p>
-            <a:r>
-              <a:rPr lang="uk-UA" dirty="0"/>
-              <a:t>     </a:t>
-            </a:r>
-            <a:r>
-              <a:rPr lang="en-US" dirty="0"/>
-              <a:t>&lt;</a:t>
-            </a:r>
-          </a:p>
-          <a:p>
-            <a:r>
-              <a:rPr lang="uk-UA" dirty="0"/>
-              <a:t>кроків</a:t>
-            </a:r>
-            <a:endParaRPr lang="ru-RU" dirty="0"/>
-          </a:p>
-        </p:txBody>
-      </p:sp>
-      <p:pic>
-        <p:nvPicPr>
-          <p:cNvPr id="1028" name="Picture 4">
+          <p:cNvSpPr>
+            <a:spLocks noGrp="1"/>
+          </p:cNvSpPr>
+          <p:nvPr>
+            <p:ph type="ftr" sz="quarter" idx="11"/>
+          </p:nvPr>
+        </p:nvSpPr>
+        <p:spPr/>
+        <p:txBody>
+          <a:bodyPr/>
+          <a:lstStyle/>
+          <a:p>
+            <a:endParaRPr lang="en-US"/>
+          </a:p>
+        </p:txBody>
+      </p:sp>
+      <p:sp>
+        <p:nvSpPr>
+          <p:cNvPr id="5" name="Номер слайда 4">
             <a:extLst>
               <a:ext uri="{FF2B5EF4-FFF2-40B4-BE49-F238E27FC236}">
-                <a16:creationId xmlns:a16="http://schemas.microsoft.com/office/drawing/2014/main" id="{38BD49EB-D08B-41FB-03DB-0D68DAAC5DE1}"/>
+                <a16:creationId xmlns:a16="http://schemas.microsoft.com/office/drawing/2014/main" id="{A52414E7-80A1-4001-AF6E-6726FCDD5136}"/>
               </a:ext>
             </a:extLst>
           </p:cNvPr>
-          <p:cNvPicPr>
-            <a:picLocks noChangeAspect="1" noChangeArrowheads="1"/>
-          </p:cNvPicPr>
-          <p:nvPr/>
-        </p:nvPicPr>
-        <p:blipFill>
-          <a:blip r:embed="rId3">
-            <a:extLst>
-              <a:ext uri="{28A0092B-C50C-407E-A947-70E740481C1C}">
-                <a14:useLocalDpi xmlns:a14="http://schemas.microsoft.com/office/drawing/2010/main" val="0"/>
-              </a:ext>
-            </a:extLst>
-          </a:blip>
-          <a:srcRect/>
-          <a:stretch>
-            <a:fillRect/>
-          </a:stretch>
-        </p:blipFill>
-        <p:spPr bwMode="auto">
-          <a:xfrm>
-            <a:off x="7731548" y="1832665"/>
-            <a:ext cx="2409825" cy="561975"/>
-          </a:xfrm>
-          <a:prstGeom prst="rect">
-            <a:avLst/>
-          </a:prstGeom>
-          <a:ln>
-            <a:noFill/>
-          </a:ln>
-          <a:effectLst>
-            <a:outerShdw blurRad="292100" dist="139700" dir="2700000" algn="tl" rotWithShape="0">
-              <a:srgbClr val="333333">
-                <a:alpha val="65000"/>
-              </a:srgbClr>
-            </a:outerShdw>
-          </a:effectLst>
-          <a:extLst>
-            <a:ext uri="{909E8E84-426E-40DD-AFC4-6F175D3DCCD1}">
-              <a14:hiddenFill xmlns:a14="http://schemas.microsoft.com/office/drawing/2010/main">
-                <a:solidFill>
-                  <a:srgbClr val="FFFFFF"/>
-                </a:solidFill>
-              </a14:hiddenFill>
-            </a:ext>
-          </a:extLst>
-        </p:spPr>
-      </p:pic>
-      <p:sp>
-        <p:nvSpPr>
-          <p:cNvPr id="8" name="TextBox 7">
-            <a:extLst>
-              <a:ext uri="{FF2B5EF4-FFF2-40B4-BE49-F238E27FC236}">
-                <a16:creationId xmlns:a16="http://schemas.microsoft.com/office/drawing/2014/main" id="{C5CC46A1-04BD-2643-B28F-05E59CB6B246}"/>
-              </a:ext>
-            </a:extLst>
-          </p:cNvPr>
-          <p:cNvSpPr txBox="1"/>
-          <p:nvPr/>
-        </p:nvSpPr>
-        <p:spPr>
-          <a:xfrm>
-            <a:off x="2374627" y="2398214"/>
-            <a:ext cx="2085827" cy="369332"/>
-          </a:xfrm>
-          <a:prstGeom prst="rect">
-            <a:avLst/>
-          </a:prstGeom>
-          <a:noFill/>
-        </p:spPr>
-        <p:txBody>
-          <a:bodyPr wrap="none" rtlCol="0">
-            <a:spAutoFit/>
-          </a:bodyPr>
+          <p:cNvSpPr>
+            <a:spLocks noGrp="1"/>
+          </p:cNvSpPr>
+          <p:nvPr>
+            <p:ph type="sldNum" sz="quarter" idx="12"/>
+          </p:nvPr>
+        </p:nvSpPr>
+        <p:spPr/>
+        <p:txBody>
+          <a:bodyPr/>
           <a:lstStyle/>
           <a:p>
-            <a:r>
-              <a:rPr lang="uk-UA" dirty="0"/>
-              <a:t>Складність</a:t>
-            </a:r>
-            <a:r>
-              <a:rPr lang="en-US" dirty="0"/>
-              <a:t>: </a:t>
-            </a:r>
-            <a:r>
-              <a:rPr lang="en-US" noProof="1">
-                <a:solidFill>
-                  <a:schemeClr val="accent2">
-                    <a:lumMod val="40000"/>
-                    <a:lumOff val="60000"/>
-                  </a:schemeClr>
-                </a:solidFill>
-              </a:rPr>
-              <a:t>O(logN)</a:t>
-            </a:r>
-          </a:p>
-        </p:txBody>
-      </p:sp>
-      <p:sp>
-        <p:nvSpPr>
-          <p:cNvPr id="9" name="TextBox 8">
-            <a:extLst>
-              <a:ext uri="{FF2B5EF4-FFF2-40B4-BE49-F238E27FC236}">
-                <a16:creationId xmlns:a16="http://schemas.microsoft.com/office/drawing/2014/main" id="{D023B607-7FA7-4DAE-9489-40A174ABA70D}"/>
-              </a:ext>
-            </a:extLst>
-          </p:cNvPr>
-          <p:cNvSpPr txBox="1"/>
-          <p:nvPr/>
-        </p:nvSpPr>
-        <p:spPr>
-          <a:xfrm>
-            <a:off x="8035412" y="2388850"/>
-            <a:ext cx="1802096" cy="369332"/>
-          </a:xfrm>
-          <a:prstGeom prst="rect">
-            <a:avLst/>
-          </a:prstGeom>
-          <a:noFill/>
-        </p:spPr>
-        <p:txBody>
-          <a:bodyPr wrap="none" rtlCol="0">
-            <a:spAutoFit/>
-          </a:bodyPr>
-          <a:lstStyle/>
-          <a:p>
-            <a:r>
-              <a:rPr lang="uk-UA" dirty="0"/>
-              <a:t>Складність</a:t>
-            </a:r>
-            <a:r>
-              <a:rPr lang="en-US" dirty="0"/>
-              <a:t>: </a:t>
-            </a:r>
-            <a:r>
-              <a:rPr lang="en-US" dirty="0">
-                <a:solidFill>
-                  <a:schemeClr val="accent2">
-                    <a:lumMod val="40000"/>
-                    <a:lumOff val="60000"/>
-                  </a:schemeClr>
-                </a:solidFill>
-              </a:rPr>
-              <a:t>O(N)</a:t>
-            </a:r>
-            <a:endParaRPr lang="uk-UA" dirty="0">
-              <a:solidFill>
-                <a:schemeClr val="accent2">
-                  <a:lumMod val="40000"/>
-                  <a:lumOff val="60000"/>
-                </a:schemeClr>
-              </a:solidFill>
-            </a:endParaRPr>
-          </a:p>
-        </p:txBody>
-      </p:sp>
-      <p:sp>
-        <p:nvSpPr>
-          <p:cNvPr id="10" name="TextBox 9">
-            <a:extLst>
-              <a:ext uri="{FF2B5EF4-FFF2-40B4-BE49-F238E27FC236}">
-                <a16:creationId xmlns:a16="http://schemas.microsoft.com/office/drawing/2014/main" id="{B7A2FE4C-DFE6-BD1D-AE04-F2DD74515918}"/>
-              </a:ext>
-            </a:extLst>
-          </p:cNvPr>
-          <p:cNvSpPr txBox="1"/>
-          <p:nvPr/>
-        </p:nvSpPr>
-        <p:spPr>
-          <a:xfrm>
-            <a:off x="4829842" y="2953467"/>
-            <a:ext cx="3174628" cy="461665"/>
-          </a:xfrm>
-          <a:prstGeom prst="rect">
-            <a:avLst/>
-          </a:prstGeom>
-          <a:noFill/>
-        </p:spPr>
-        <p:txBody>
-          <a:bodyPr wrap="square" rtlCol="0">
-            <a:spAutoFit/>
-          </a:bodyPr>
-          <a:lstStyle>
-            <a:defPPr>
-              <a:defRPr lang="en-US"/>
-            </a:defPPr>
-          </a:lstStyle>
-          <a:p>
-            <a:r>
-              <a:rPr lang="uk-UA" sz="2400" b="1" dirty="0">
-                <a:solidFill>
-                  <a:schemeClr val="tx1">
-                    <a:lumMod val="95000"/>
-                  </a:schemeClr>
-                </a:solidFill>
-                <a:ea typeface="+mj-ea"/>
-                <a:cs typeface="+mj-cs"/>
-              </a:rPr>
-              <a:t>Алгоритм</a:t>
-            </a:r>
-            <a:r>
-              <a:rPr lang="uk-UA" sz="2400" b="1" dirty="0">
-                <a:solidFill>
-                  <a:srgbClr val="0070C0"/>
-                </a:solidFill>
-                <a:ea typeface="+mj-ea"/>
-                <a:cs typeface="+mj-cs"/>
-              </a:rPr>
-              <a:t> </a:t>
-            </a:r>
-            <a:r>
-              <a:rPr lang="en-US" sz="2400" b="1" noProof="1">
-                <a:solidFill>
-                  <a:schemeClr val="accent2">
-                    <a:lumMod val="40000"/>
-                    <a:lumOff val="60000"/>
-                  </a:schemeClr>
-                </a:solidFill>
-                <a:latin typeface="SchoolBookCTT"/>
-                <a:ea typeface="+mj-ea"/>
-                <a:cs typeface="+mj-cs"/>
-              </a:rPr>
-              <a:t>O(logN)</a:t>
-            </a:r>
-            <a:endParaRPr lang="en-US" sz="2400" b="1" noProof="1">
-              <a:solidFill>
-                <a:schemeClr val="accent2">
-                  <a:lumMod val="40000"/>
-                  <a:lumOff val="60000"/>
-                </a:schemeClr>
-              </a:solidFill>
-              <a:ea typeface="+mj-ea"/>
-              <a:cs typeface="+mj-cs"/>
-            </a:endParaRPr>
-          </a:p>
-        </p:txBody>
-      </p:sp>
-      <p:pic>
-        <p:nvPicPr>
-          <p:cNvPr id="1030" name="Picture 6">
-            <a:extLst>
-              <a:ext uri="{FF2B5EF4-FFF2-40B4-BE49-F238E27FC236}">
-                <a16:creationId xmlns:a16="http://schemas.microsoft.com/office/drawing/2014/main" id="{FD280F7D-71AA-58B4-F1FF-0DBEA66BE9C6}"/>
-              </a:ext>
-            </a:extLst>
-          </p:cNvPr>
-          <p:cNvPicPr>
-            <a:picLocks noChangeAspect="1" noChangeArrowheads="1"/>
-          </p:cNvPicPr>
-          <p:nvPr/>
-        </p:nvPicPr>
-        <p:blipFill>
-          <a:blip r:embed="rId4">
-            <a:extLst>
-              <a:ext uri="{28A0092B-C50C-407E-A947-70E740481C1C}">
-                <a14:useLocalDpi xmlns:a14="http://schemas.microsoft.com/office/drawing/2010/main" val="0"/>
-              </a:ext>
-            </a:extLst>
-          </a:blip>
-          <a:srcRect/>
-          <a:stretch>
-            <a:fillRect/>
-          </a:stretch>
-        </p:blipFill>
-        <p:spPr bwMode="auto">
-          <a:xfrm>
-            <a:off x="1273656" y="3607360"/>
-            <a:ext cx="10287000" cy="2314575"/>
-          </a:xfrm>
-          <a:prstGeom prst="rect">
-            <a:avLst/>
-          </a:prstGeom>
-          <a:ln>
-            <a:noFill/>
-          </a:ln>
-          <a:effectLst>
-            <a:outerShdw blurRad="292100" dist="139700" dir="2700000" algn="tl" rotWithShape="0">
-              <a:srgbClr val="333333">
-                <a:alpha val="65000"/>
-              </a:srgbClr>
-            </a:outerShdw>
-          </a:effectLst>
-          <a:extLst>
-            <a:ext uri="{909E8E84-426E-40DD-AFC4-6F175D3DCCD1}">
-              <a14:hiddenFill xmlns:a14="http://schemas.microsoft.com/office/drawing/2010/main">
-                <a:solidFill>
-                  <a:srgbClr val="FFFFFF"/>
-                </a:solidFill>
-              </a14:hiddenFill>
-            </a:ext>
-          </a:extLst>
-        </p:spPr>
-      </p:pic>
+            <a:fld id="{6D22F896-40B5-4ADD-8801-0D06FADFA095}" type="slidenum">
+              <a:rPr lang="en-US" smtClean="0"/>
+              <a:pPr/>
+              <a:t>11</a:t>
+            </a:fld>
+            <a:endParaRPr lang="en-US"/>
+          </a:p>
+        </p:txBody>
+      </p:sp>
     </p:spTree>
     <p:extLst>
       <p:ext uri="{BB962C8B-B14F-4D97-AF65-F5344CB8AC3E}">
-        <p14:creationId xmlns:p14="http://schemas.microsoft.com/office/powerpoint/2010/main" val="1395489774"/>
+        <p14:creationId xmlns:p14="http://schemas.microsoft.com/office/powerpoint/2010/main" val="2798573669"/>
       </p:ext>
     </p:extLst>
   </p:cSld>
@@ -7494,7 +7045,7 @@
           <p:cNvPr id="2" name="Заголовок 1">
             <a:extLst>
               <a:ext uri="{FF2B5EF4-FFF2-40B4-BE49-F238E27FC236}">
-                <a16:creationId xmlns:a16="http://schemas.microsoft.com/office/drawing/2014/main" id="{AD736626-17D6-057B-9F31-A58621D08ABE}"/>
+                <a16:creationId xmlns:a16="http://schemas.microsoft.com/office/drawing/2014/main" id="{A4481AE8-1A19-4B4A-9B85-F68BB996B1AB}"/>
               </a:ext>
             </a:extLst>
           </p:cNvPr>
@@ -7505,379 +7056,103 @@
             <p:ph type="title"/>
           </p:nvPr>
         </p:nvSpPr>
-        <p:spPr>
-          <a:xfrm>
-            <a:off x="4183480" y="680363"/>
-            <a:ext cx="3825039" cy="632390"/>
-          </a:xfrm>
-        </p:spPr>
-        <p:txBody>
-          <a:bodyPr>
-            <a:normAutofit fontScale="90000"/>
-          </a:bodyPr>
+        <p:spPr/>
+        <p:txBody>
+          <a:bodyPr/>
           <a:lstStyle/>
           <a:p>
-            <a:pPr algn="ctr"/>
-            <a:r>
-              <a:rPr lang="uk-UA" b="1" dirty="0">
-                <a:solidFill>
-                  <a:schemeClr val="tx1">
-                    <a:lumMod val="95000"/>
-                  </a:schemeClr>
-                </a:solidFill>
-                <a:latin typeface="SchoolBookCTT"/>
-              </a:rPr>
-              <a:t>Тест алгоритмів</a:t>
-            </a:r>
-            <a:endParaRPr lang="uk-UA" dirty="0">
-              <a:solidFill>
-                <a:schemeClr val="tx1">
-                  <a:lumMod val="95000"/>
-                </a:schemeClr>
-              </a:solidFill>
-            </a:endParaRPr>
-          </a:p>
-        </p:txBody>
-      </p:sp>
-      <p:grpSp>
-        <p:nvGrpSpPr>
-          <p:cNvPr id="3" name="Групувати 2">
+            <a:endParaRPr lang="ru-UA"/>
+          </a:p>
+        </p:txBody>
+      </p:sp>
+      <p:pic>
+        <p:nvPicPr>
+          <p:cNvPr id="7" name="Объект 6">
             <a:extLst>
               <a:ext uri="{FF2B5EF4-FFF2-40B4-BE49-F238E27FC236}">
-                <a16:creationId xmlns:a16="http://schemas.microsoft.com/office/drawing/2014/main" id="{EFF48B7F-F191-93AE-6CB6-087AA3768F68}"/>
+                <a16:creationId xmlns:a16="http://schemas.microsoft.com/office/drawing/2014/main" id="{29320F1B-144C-432C-AA31-31E219A8C51F}"/>
               </a:ext>
             </a:extLst>
           </p:cNvPr>
-          <p:cNvGrpSpPr/>
-          <p:nvPr/>
-        </p:nvGrpSpPr>
-        <p:grpSpPr>
-          <a:xfrm>
-            <a:off x="7592373" y="1820464"/>
-            <a:ext cx="3419475" cy="1253016"/>
-            <a:chOff x="7983711" y="1820464"/>
-            <a:chExt cx="3419475" cy="1253016"/>
-          </a:xfrm>
-        </p:grpSpPr>
-        <p:sp>
-          <p:nvSpPr>
-            <p:cNvPr id="7" name="TextBox 6">
-              <a:extLst>
-                <a:ext uri="{FF2B5EF4-FFF2-40B4-BE49-F238E27FC236}">
-                  <a16:creationId xmlns:a16="http://schemas.microsoft.com/office/drawing/2014/main" id="{E16DC57C-F86C-BFA1-333D-695352CB9F22}"/>
-                </a:ext>
-              </a:extLst>
-            </p:cNvPr>
-            <p:cNvSpPr txBox="1"/>
-            <p:nvPr/>
-          </p:nvSpPr>
-          <p:spPr>
-            <a:xfrm>
-              <a:off x="8295215" y="1820464"/>
-              <a:ext cx="2796466" cy="954107"/>
-            </a:xfrm>
-            <a:prstGeom prst="rect">
-              <a:avLst/>
-            </a:prstGeom>
-            <a:noFill/>
-          </p:spPr>
-          <p:txBody>
-            <a:bodyPr wrap="square" rtlCol="0">
-              <a:spAutoFit/>
-            </a:bodyPr>
-            <a:lstStyle/>
-            <a:p>
-              <a:pPr algn="ctr"/>
-              <a:r>
-                <a:rPr lang="en-US" sz="2000" b="1" dirty="0">
-                  <a:solidFill>
-                    <a:schemeClr val="accent2">
-                      <a:lumMod val="40000"/>
-                      <a:lumOff val="60000"/>
-                    </a:schemeClr>
-                  </a:solidFill>
-                  <a:latin typeface="SchoolBookCTT"/>
-                  <a:ea typeface="+mj-ea"/>
-                  <a:cs typeface="+mj-cs"/>
-                </a:rPr>
-                <a:t>O(N)</a:t>
-              </a:r>
-            </a:p>
-            <a:p>
-              <a:r>
-                <a:rPr lang="uk-UA" dirty="0"/>
-                <a:t>Основа  = 3, ступінь  = 40</a:t>
-              </a:r>
-            </a:p>
-            <a:p>
-              <a:endParaRPr lang="uk-UA" dirty="0"/>
-            </a:p>
-          </p:txBody>
-        </p:sp>
-        <p:pic>
-          <p:nvPicPr>
-            <p:cNvPr id="2052" name="Picture 4">
-              <a:extLst>
-                <a:ext uri="{FF2B5EF4-FFF2-40B4-BE49-F238E27FC236}">
-                  <a16:creationId xmlns:a16="http://schemas.microsoft.com/office/drawing/2014/main" id="{1FBCDCF3-F858-62A7-CFCF-F039324BD193}"/>
-                </a:ext>
-              </a:extLst>
-            </p:cNvPr>
-            <p:cNvPicPr>
-              <a:picLocks noChangeAspect="1" noChangeArrowheads="1"/>
-            </p:cNvPicPr>
-            <p:nvPr/>
-          </p:nvPicPr>
-          <p:blipFill>
-            <a:blip r:embed="rId2">
-              <a:extLst>
-                <a:ext uri="{28A0092B-C50C-407E-A947-70E740481C1C}">
-                  <a14:useLocalDpi xmlns:a14="http://schemas.microsoft.com/office/drawing/2010/main" val="0"/>
-                </a:ext>
-              </a:extLst>
-            </a:blip>
-            <a:srcRect/>
-            <a:stretch>
-              <a:fillRect/>
-            </a:stretch>
-          </p:blipFill>
-          <p:spPr bwMode="auto">
-            <a:xfrm>
-              <a:off x="7983711" y="2644855"/>
-              <a:ext cx="3419475" cy="428625"/>
-            </a:xfrm>
-            <a:prstGeom prst="rect">
-              <a:avLst/>
-            </a:prstGeom>
-            <a:noFill/>
-            <a:extLst>
-              <a:ext uri="{909E8E84-426E-40DD-AFC4-6F175D3DCCD1}">
-                <a14:hiddenFill xmlns:a14="http://schemas.microsoft.com/office/drawing/2010/main">
-                  <a:solidFill>
-                    <a:srgbClr val="FFFFFF"/>
-                  </a:solidFill>
-                </a14:hiddenFill>
-              </a:ext>
-            </a:extLst>
-          </p:spPr>
-        </p:pic>
-      </p:grpSp>
-      <p:grpSp>
-        <p:nvGrpSpPr>
-          <p:cNvPr id="8" name="Групувати 7">
+          <p:cNvPicPr>
+            <a:picLocks noGrp="1" noChangeAspect="1"/>
+          </p:cNvPicPr>
+          <p:nvPr>
+            <p:ph idx="1"/>
+          </p:nvPr>
+        </p:nvPicPr>
+        <p:blipFill>
+          <a:blip r:embed="rId2"/>
+          <a:stretch>
+            <a:fillRect/>
+          </a:stretch>
+        </p:blipFill>
+        <p:spPr>
+          <a:xfrm>
+            <a:off x="0" y="-1"/>
+            <a:ext cx="12192000" cy="6858001"/>
+          </a:xfrm>
+        </p:spPr>
+      </p:pic>
+      <p:sp>
+        <p:nvSpPr>
+          <p:cNvPr id="4" name="Нижний колонтитул 3">
             <a:extLst>
               <a:ext uri="{FF2B5EF4-FFF2-40B4-BE49-F238E27FC236}">
-                <a16:creationId xmlns:a16="http://schemas.microsoft.com/office/drawing/2014/main" id="{F2C3B138-D3A4-8ACA-9051-B844BBEDB5B0}"/>
+                <a16:creationId xmlns:a16="http://schemas.microsoft.com/office/drawing/2014/main" id="{B63D7AD7-3755-4876-96DB-5766D51C5756}"/>
               </a:ext>
             </a:extLst>
           </p:cNvPr>
-          <p:cNvGrpSpPr/>
-          <p:nvPr/>
-        </p:nvGrpSpPr>
-        <p:grpSpPr>
-          <a:xfrm>
-            <a:off x="1093939" y="1820464"/>
-            <a:ext cx="3505689" cy="1253016"/>
-            <a:chOff x="1093940" y="1820464"/>
-            <a:chExt cx="3505689" cy="1253016"/>
-          </a:xfrm>
-        </p:grpSpPr>
-        <p:sp>
-          <p:nvSpPr>
-            <p:cNvPr id="6" name="TextBox 5">
-              <a:extLst>
-                <a:ext uri="{FF2B5EF4-FFF2-40B4-BE49-F238E27FC236}">
-                  <a16:creationId xmlns:a16="http://schemas.microsoft.com/office/drawing/2014/main" id="{5C07C264-0AA7-4D07-55FF-648308427264}"/>
-                </a:ext>
-              </a:extLst>
-            </p:cNvPr>
-            <p:cNvSpPr txBox="1"/>
-            <p:nvPr/>
-          </p:nvSpPr>
-          <p:spPr>
-            <a:xfrm>
-              <a:off x="1448551" y="1820464"/>
-              <a:ext cx="2796466" cy="677108"/>
-            </a:xfrm>
-            <a:prstGeom prst="rect">
-              <a:avLst/>
-            </a:prstGeom>
-            <a:noFill/>
-          </p:spPr>
-          <p:txBody>
-            <a:bodyPr wrap="square" rtlCol="0">
-              <a:spAutoFit/>
-            </a:bodyPr>
-            <a:lstStyle/>
-            <a:p>
-              <a:pPr algn="ctr"/>
-              <a:r>
-                <a:rPr lang="en-US" sz="2000" b="1" dirty="0">
-                  <a:solidFill>
-                    <a:schemeClr val="accent2">
-                      <a:lumMod val="40000"/>
-                      <a:lumOff val="60000"/>
-                    </a:schemeClr>
-                  </a:solidFill>
-                  <a:latin typeface="SchoolBookCTT"/>
-                  <a:ea typeface="+mj-ea"/>
-                  <a:cs typeface="+mj-cs"/>
-                </a:rPr>
-                <a:t>O(</a:t>
-              </a:r>
-              <a:r>
-                <a:rPr lang="en-US" sz="2000" b="1" noProof="1">
-                  <a:solidFill>
-                    <a:schemeClr val="accent2">
-                      <a:lumMod val="40000"/>
-                      <a:lumOff val="60000"/>
-                    </a:schemeClr>
-                  </a:solidFill>
-                  <a:latin typeface="SchoolBookCTT"/>
-                  <a:ea typeface="+mj-ea"/>
-                  <a:cs typeface="+mj-cs"/>
-                </a:rPr>
-                <a:t>logN</a:t>
-              </a:r>
-              <a:r>
-                <a:rPr lang="en-US" sz="2000" b="1" dirty="0">
-                  <a:solidFill>
-                    <a:schemeClr val="accent2">
-                      <a:lumMod val="40000"/>
-                      <a:lumOff val="60000"/>
-                    </a:schemeClr>
-                  </a:solidFill>
-                  <a:latin typeface="SchoolBookCTT"/>
-                  <a:ea typeface="+mj-ea"/>
-                  <a:cs typeface="+mj-cs"/>
-                </a:rPr>
-                <a:t>)</a:t>
-              </a:r>
-              <a:endParaRPr lang="uk-UA" dirty="0">
-                <a:solidFill>
-                  <a:schemeClr val="accent2">
-                    <a:lumMod val="40000"/>
-                    <a:lumOff val="60000"/>
-                  </a:schemeClr>
-                </a:solidFill>
-              </a:endParaRPr>
-            </a:p>
-            <a:p>
-              <a:r>
-                <a:rPr lang="uk-UA" dirty="0"/>
-                <a:t>Основа  = 3, ступінь  = 40</a:t>
-              </a:r>
-            </a:p>
-          </p:txBody>
-        </p:sp>
-        <p:pic>
-          <p:nvPicPr>
-            <p:cNvPr id="9" name="Рисунок 8">
-              <a:extLst>
-                <a:ext uri="{FF2B5EF4-FFF2-40B4-BE49-F238E27FC236}">
-                  <a16:creationId xmlns:a16="http://schemas.microsoft.com/office/drawing/2014/main" id="{28FCBF9D-16DF-17D7-C7D6-4865DFE2B00B}"/>
-                </a:ext>
-              </a:extLst>
-            </p:cNvPr>
-            <p:cNvPicPr>
-              <a:picLocks noChangeAspect="1"/>
-            </p:cNvPicPr>
-            <p:nvPr/>
-          </p:nvPicPr>
-          <p:blipFill>
-            <a:blip r:embed="rId3"/>
-            <a:stretch>
-              <a:fillRect/>
-            </a:stretch>
-          </p:blipFill>
-          <p:spPr>
-            <a:xfrm>
-              <a:off x="1093940" y="2644795"/>
-              <a:ext cx="3505689" cy="428685"/>
-            </a:xfrm>
-            <a:prstGeom prst="rect">
-              <a:avLst/>
-            </a:prstGeom>
-          </p:spPr>
-        </p:pic>
-      </p:grpSp>
-      <p:sp>
-        <p:nvSpPr>
-          <p:cNvPr id="10" name="TextBox 9">
+          <p:cNvSpPr>
+            <a:spLocks noGrp="1"/>
+          </p:cNvSpPr>
+          <p:nvPr>
+            <p:ph type="ftr" sz="quarter" idx="11"/>
+          </p:nvPr>
+        </p:nvSpPr>
+        <p:spPr/>
+        <p:txBody>
+          <a:bodyPr/>
+          <a:lstStyle/>
+          <a:p>
+            <a:endParaRPr lang="en-US"/>
+          </a:p>
+        </p:txBody>
+      </p:sp>
+      <p:sp>
+        <p:nvSpPr>
+          <p:cNvPr id="5" name="Номер слайда 4">
             <a:extLst>
               <a:ext uri="{FF2B5EF4-FFF2-40B4-BE49-F238E27FC236}">
-                <a16:creationId xmlns:a16="http://schemas.microsoft.com/office/drawing/2014/main" id="{51447627-F5F2-2E37-6885-9C5187086371}"/>
+                <a16:creationId xmlns:a16="http://schemas.microsoft.com/office/drawing/2014/main" id="{96A55766-CE45-4612-8F96-C27CC144026B}"/>
               </a:ext>
             </a:extLst>
           </p:cNvPr>
-          <p:cNvSpPr txBox="1"/>
-          <p:nvPr/>
-        </p:nvSpPr>
-        <p:spPr>
-          <a:xfrm>
-            <a:off x="2588043" y="4010362"/>
-            <a:ext cx="7477745" cy="461665"/>
-          </a:xfrm>
-          <a:prstGeom prst="rect">
-            <a:avLst/>
-          </a:prstGeom>
-          <a:noFill/>
-        </p:spPr>
-        <p:txBody>
-          <a:bodyPr wrap="square" rtlCol="0">
-            <a:spAutoFit/>
-          </a:bodyPr>
+          <p:cNvSpPr>
+            <a:spLocks noGrp="1"/>
+          </p:cNvSpPr>
+          <p:nvPr>
+            <p:ph type="sldNum" sz="quarter" idx="12"/>
+          </p:nvPr>
+        </p:nvSpPr>
+        <p:spPr/>
+        <p:txBody>
+          <a:bodyPr/>
           <a:lstStyle/>
           <a:p>
-            <a:r>
-              <a:rPr lang="uk-UA" sz="2400" dirty="0"/>
-              <a:t>Висновок:  </a:t>
-            </a:r>
-            <a:r>
-              <a:rPr lang="en-US" sz="2400" noProof="1">
-                <a:solidFill>
-                  <a:schemeClr val="accent2">
-                    <a:lumMod val="40000"/>
-                    <a:lumOff val="60000"/>
-                  </a:schemeClr>
-                </a:solidFill>
-              </a:rPr>
-              <a:t>O(logN)</a:t>
-            </a:r>
-            <a:r>
-              <a:rPr lang="en-US" sz="2400" dirty="0"/>
-              <a:t> </a:t>
-            </a:r>
-            <a:r>
-              <a:rPr lang="uk-UA" sz="2400" dirty="0"/>
-              <a:t>працює швидше ніж </a:t>
-            </a:r>
-            <a:r>
-              <a:rPr lang="en-US" sz="2400" dirty="0">
-                <a:solidFill>
-                  <a:schemeClr val="accent2">
-                    <a:lumMod val="40000"/>
-                    <a:lumOff val="60000"/>
-                  </a:schemeClr>
-                </a:solidFill>
-              </a:rPr>
-              <a:t>O(N)</a:t>
-            </a:r>
-            <a:r>
-              <a:rPr lang="en-US" sz="2400" dirty="0"/>
-              <a:t> </a:t>
-            </a:r>
-            <a:r>
-              <a:rPr lang="uk-UA" sz="2400" dirty="0"/>
-              <a:t> на 116%</a:t>
-            </a:r>
+            <a:fld id="{6D22F896-40B5-4ADD-8801-0D06FADFA095}" type="slidenum">
+              <a:rPr lang="en-US" smtClean="0"/>
+              <a:pPr/>
+              <a:t>12</a:t>
+            </a:fld>
+            <a:endParaRPr lang="en-US"/>
           </a:p>
         </p:txBody>
       </p:sp>
     </p:spTree>
     <p:extLst>
       <p:ext uri="{BB962C8B-B14F-4D97-AF65-F5344CB8AC3E}">
-        <p14:creationId xmlns:p14="http://schemas.microsoft.com/office/powerpoint/2010/main" val="444281193"/>
+        <p14:creationId xmlns:p14="http://schemas.microsoft.com/office/powerpoint/2010/main" val="2436894243"/>
       </p:ext>
     </p:extLst>
   </p:cSld>
@@ -11213,18 +10488,18 @@
 </file>
 
 <file path=customXml/item1.xml><?xml version="1.0" encoding="utf-8"?>
-<p:properties xmlns:p="http://schemas.microsoft.com/office/2006/metadata/properties" xmlns:xsi="http://www.w3.org/2001/XMLSchema-instance" xmlns:pc="http://schemas.microsoft.com/office/infopath/2007/PartnerControls">
-  <documentManagement/>
-</p:properties>
-</file>
-
-<file path=customXml/item2.xml><?xml version="1.0" encoding="utf-8"?>
 <?mso-contentType ?>
 <FormTemplates xmlns="http://schemas.microsoft.com/sharepoint/v3/contenttype/forms">
   <Display>DocumentLibraryForm</Display>
   <Edit>DocumentLibraryForm</Edit>
   <New>DocumentLibraryForm</New>
 </FormTemplates>
+</file>
+
+<file path=customXml/item2.xml><?xml version="1.0" encoding="utf-8"?>
+<p:properties xmlns:p="http://schemas.microsoft.com/office/2006/metadata/properties" xmlns:xsi="http://www.w3.org/2001/XMLSchema-instance" xmlns:pc="http://schemas.microsoft.com/office/infopath/2007/PartnerControls">
+  <documentManagement/>
+</p:properties>
 </file>
 
 <file path=customXml/item3.xml><?xml version="1.0" encoding="utf-8"?>
@@ -11372,18 +10647,18 @@
 </file>
 
 <file path=customXml/itemProps1.xml><?xml version="1.0" encoding="utf-8"?>
-<ds:datastoreItem xmlns:ds="http://schemas.openxmlformats.org/officeDocument/2006/customXml" ds:itemID="{C35D743B-B188-4C38-B82D-7FD8B3A77642}">
+<ds:datastoreItem xmlns:ds="http://schemas.openxmlformats.org/officeDocument/2006/customXml" ds:itemID="{A345D2DA-A096-4BBF-9135-8FD4BD4C8C20}">
   <ds:schemaRefs>
-    <ds:schemaRef ds:uri="http://schemas.microsoft.com/office/2006/metadata/properties"/>
-    <ds:schemaRef ds:uri="http://schemas.microsoft.com/office/infopath/2007/PartnerControls"/>
+    <ds:schemaRef ds:uri="http://schemas.microsoft.com/sharepoint/v3/contenttype/forms"/>
   </ds:schemaRefs>
 </ds:datastoreItem>
 </file>
 
 <file path=customXml/itemProps2.xml><?xml version="1.0" encoding="utf-8"?>
-<ds:datastoreItem xmlns:ds="http://schemas.openxmlformats.org/officeDocument/2006/customXml" ds:itemID="{A345D2DA-A096-4BBF-9135-8FD4BD4C8C20}">
+<ds:datastoreItem xmlns:ds="http://schemas.openxmlformats.org/officeDocument/2006/customXml" ds:itemID="{C35D743B-B188-4C38-B82D-7FD8B3A77642}">
   <ds:schemaRefs>
-    <ds:schemaRef ds:uri="http://schemas.microsoft.com/sharepoint/v3/contenttype/forms"/>
+    <ds:schemaRef ds:uri="http://schemas.microsoft.com/office/2006/metadata/properties"/>
+    <ds:schemaRef ds:uri="http://schemas.microsoft.com/office/infopath/2007/PartnerControls"/>
   </ds:schemaRefs>
 </ds:datastoreItem>
 </file>

</xml_diff>